<commit_message>
updated powerpoint, and aug_pipeline
</commit_message>
<xml_diff>
--- a/project_info/water_crystal_synthesis_v1.pptx
+++ b/project_info/water_crystal_synthesis_v1.pptx
@@ -4,9 +4,18 @@
   <p:sldMasterIdLst>
     <p:sldMasterId id="2147483699" r:id="rId1"/>
   </p:sldMasterIdLst>
+  <p:notesMasterIdLst>
+    <p:notesMasterId r:id="rId10"/>
+  </p:notesMasterIdLst>
   <p:sldIdLst>
     <p:sldId id="256" r:id="rId2"/>
     <p:sldId id="257" r:id="rId3"/>
+    <p:sldId id="258" r:id="rId4"/>
+    <p:sldId id="259" r:id="rId5"/>
+    <p:sldId id="260" r:id="rId6"/>
+    <p:sldId id="261" r:id="rId7"/>
+    <p:sldId id="262" r:id="rId8"/>
+    <p:sldId id="263" r:id="rId9"/>
   </p:sldIdLst>
   <p:sldSz cx="12192000" cy="6858000"/>
   <p:notesSz cx="6858000" cy="9144000"/>
@@ -105,7 +114,361 @@
       </a:defRPr>
     </a:lvl9pPr>
   </p:defaultTextStyle>
+  <p:extLst>
+    <p:ext uri="{EFAFB233-063F-42B5-8137-9DF3F51BA10A}">
+      <p15:sldGuideLst xmlns:p15="http://schemas.microsoft.com/office/powerpoint/2012/main"/>
+    </p:ext>
+  </p:extLst>
 </p:presentation>
+</file>
+
+<file path=ppt/notesMasters/notesMaster1.xml><?xml version="1.0" encoding="utf-8"?>
+<p:notesMaster xmlns:a="http://schemas.openxmlformats.org/drawingml/2006/main" xmlns:r="http://schemas.openxmlformats.org/officeDocument/2006/relationships" xmlns:p="http://schemas.openxmlformats.org/presentationml/2006/main">
+  <p:cSld>
+    <p:bg>
+      <p:bgRef idx="1001">
+        <a:schemeClr val="bg1"/>
+      </p:bgRef>
+    </p:bg>
+    <p:spTree>
+      <p:nvGrpSpPr>
+        <p:cNvPr id="1" name=""/>
+        <p:cNvGrpSpPr/>
+        <p:nvPr/>
+      </p:nvGrpSpPr>
+      <p:grpSpPr>
+        <a:xfrm>
+          <a:off x="0" y="0"/>
+          <a:ext cx="0" cy="0"/>
+          <a:chOff x="0" y="0"/>
+          <a:chExt cx="0" cy="0"/>
+        </a:xfrm>
+      </p:grpSpPr>
+      <p:sp>
+        <p:nvSpPr>
+          <p:cNvPr id="2" name="Header Placeholder 1"/>
+          <p:cNvSpPr>
+            <a:spLocks noGrp="1"/>
+          </p:cNvSpPr>
+          <p:nvPr>
+            <p:ph type="hdr" sz="quarter"/>
+          </p:nvPr>
+        </p:nvSpPr>
+        <p:spPr>
+          <a:xfrm>
+            <a:off x="0" y="0"/>
+            <a:ext cx="2971800" cy="458788"/>
+          </a:xfrm>
+          <a:prstGeom prst="rect">
+            <a:avLst/>
+          </a:prstGeom>
+        </p:spPr>
+        <p:txBody>
+          <a:bodyPr vert="horz" lIns="91440" tIns="45720" rIns="91440" bIns="45720" rtlCol="0"/>
+          <a:lstStyle>
+            <a:lvl1pPr algn="l">
+              <a:defRPr sz="1200"/>
+            </a:lvl1pPr>
+          </a:lstStyle>
+          <a:p>
+            <a:endParaRPr lang="en-US"/>
+          </a:p>
+        </p:txBody>
+      </p:sp>
+      <p:sp>
+        <p:nvSpPr>
+          <p:cNvPr id="3" name="Date Placeholder 2"/>
+          <p:cNvSpPr>
+            <a:spLocks noGrp="1"/>
+          </p:cNvSpPr>
+          <p:nvPr>
+            <p:ph type="dt" idx="1"/>
+          </p:nvPr>
+        </p:nvSpPr>
+        <p:spPr>
+          <a:xfrm>
+            <a:off x="3884613" y="0"/>
+            <a:ext cx="2971800" cy="458788"/>
+          </a:xfrm>
+          <a:prstGeom prst="rect">
+            <a:avLst/>
+          </a:prstGeom>
+        </p:spPr>
+        <p:txBody>
+          <a:bodyPr vert="horz" lIns="91440" tIns="45720" rIns="91440" bIns="45720" rtlCol="0"/>
+          <a:lstStyle>
+            <a:lvl1pPr algn="r">
+              <a:defRPr sz="1200"/>
+            </a:lvl1pPr>
+          </a:lstStyle>
+          <a:p>
+            <a:fld id="{67FF7FFE-2A0E-4445-9A0E-2A7DC65B817F}" type="datetimeFigureOut">
+              <a:rPr lang="en-US" smtClean="0"/>
+              <a:t>3/23/2023</a:t>
+            </a:fld>
+            <a:endParaRPr lang="en-US"/>
+          </a:p>
+        </p:txBody>
+      </p:sp>
+      <p:sp>
+        <p:nvSpPr>
+          <p:cNvPr id="4" name="Slide Image Placeholder 3"/>
+          <p:cNvSpPr>
+            <a:spLocks noGrp="1" noRot="1" noChangeAspect="1"/>
+          </p:cNvSpPr>
+          <p:nvPr>
+            <p:ph type="sldImg" idx="2"/>
+          </p:nvPr>
+        </p:nvSpPr>
+        <p:spPr>
+          <a:xfrm>
+            <a:off x="685800" y="1143000"/>
+            <a:ext cx="5486400" cy="3086100"/>
+          </a:xfrm>
+          <a:prstGeom prst="rect">
+            <a:avLst/>
+          </a:prstGeom>
+          <a:noFill/>
+          <a:ln w="12700">
+            <a:solidFill>
+              <a:prstClr val="black"/>
+            </a:solidFill>
+          </a:ln>
+        </p:spPr>
+        <p:txBody>
+          <a:bodyPr vert="horz" lIns="91440" tIns="45720" rIns="91440" bIns="45720" rtlCol="0" anchor="ctr"/>
+          <a:lstStyle/>
+          <a:p>
+            <a:endParaRPr lang="en-US"/>
+          </a:p>
+        </p:txBody>
+      </p:sp>
+      <p:sp>
+        <p:nvSpPr>
+          <p:cNvPr id="5" name="Notes Placeholder 4"/>
+          <p:cNvSpPr>
+            <a:spLocks noGrp="1"/>
+          </p:cNvSpPr>
+          <p:nvPr>
+            <p:ph type="body" sz="quarter" idx="3"/>
+          </p:nvPr>
+        </p:nvSpPr>
+        <p:spPr>
+          <a:xfrm>
+            <a:off x="685800" y="4400550"/>
+            <a:ext cx="5486400" cy="3600450"/>
+          </a:xfrm>
+          <a:prstGeom prst="rect">
+            <a:avLst/>
+          </a:prstGeom>
+        </p:spPr>
+        <p:txBody>
+          <a:bodyPr vert="horz" lIns="91440" tIns="45720" rIns="91440" bIns="45720" rtlCol="0"/>
+          <a:lstStyle/>
+          <a:p>
+            <a:pPr lvl="0"/>
+            <a:r>
+              <a:rPr lang="en-US"/>
+              <a:t>Click to edit Master text styles</a:t>
+            </a:r>
+          </a:p>
+          <a:p>
+            <a:pPr lvl="1"/>
+            <a:r>
+              <a:rPr lang="en-US"/>
+              <a:t>Second level</a:t>
+            </a:r>
+          </a:p>
+          <a:p>
+            <a:pPr lvl="2"/>
+            <a:r>
+              <a:rPr lang="en-US"/>
+              <a:t>Third level</a:t>
+            </a:r>
+          </a:p>
+          <a:p>
+            <a:pPr lvl="3"/>
+            <a:r>
+              <a:rPr lang="en-US"/>
+              <a:t>Fourth level</a:t>
+            </a:r>
+          </a:p>
+          <a:p>
+            <a:pPr lvl="4"/>
+            <a:r>
+              <a:rPr lang="en-US"/>
+              <a:t>Fifth level</a:t>
+            </a:r>
+          </a:p>
+        </p:txBody>
+      </p:sp>
+      <p:sp>
+        <p:nvSpPr>
+          <p:cNvPr id="6" name="Footer Placeholder 5"/>
+          <p:cNvSpPr>
+            <a:spLocks noGrp="1"/>
+          </p:cNvSpPr>
+          <p:nvPr>
+            <p:ph type="ftr" sz="quarter" idx="4"/>
+          </p:nvPr>
+        </p:nvSpPr>
+        <p:spPr>
+          <a:xfrm>
+            <a:off x="0" y="8685213"/>
+            <a:ext cx="2971800" cy="458787"/>
+          </a:xfrm>
+          <a:prstGeom prst="rect">
+            <a:avLst/>
+          </a:prstGeom>
+        </p:spPr>
+        <p:txBody>
+          <a:bodyPr vert="horz" lIns="91440" tIns="45720" rIns="91440" bIns="45720" rtlCol="0" anchor="b"/>
+          <a:lstStyle>
+            <a:lvl1pPr algn="l">
+              <a:defRPr sz="1200"/>
+            </a:lvl1pPr>
+          </a:lstStyle>
+          <a:p>
+            <a:endParaRPr lang="en-US"/>
+          </a:p>
+        </p:txBody>
+      </p:sp>
+      <p:sp>
+        <p:nvSpPr>
+          <p:cNvPr id="7" name="Slide Number Placeholder 6"/>
+          <p:cNvSpPr>
+            <a:spLocks noGrp="1"/>
+          </p:cNvSpPr>
+          <p:nvPr>
+            <p:ph type="sldNum" sz="quarter" idx="5"/>
+          </p:nvPr>
+        </p:nvSpPr>
+        <p:spPr>
+          <a:xfrm>
+            <a:off x="3884613" y="8685213"/>
+            <a:ext cx="2971800" cy="458787"/>
+          </a:xfrm>
+          <a:prstGeom prst="rect">
+            <a:avLst/>
+          </a:prstGeom>
+        </p:spPr>
+        <p:txBody>
+          <a:bodyPr vert="horz" lIns="91440" tIns="45720" rIns="91440" bIns="45720" rtlCol="0" anchor="b"/>
+          <a:lstStyle>
+            <a:lvl1pPr algn="r">
+              <a:defRPr sz="1200"/>
+            </a:lvl1pPr>
+          </a:lstStyle>
+          <a:p>
+            <a:fld id="{AB088BC8-9975-41B9-BCE3-95273C2522FE}" type="slidenum">
+              <a:rPr lang="en-US" smtClean="0"/>
+              <a:t>‹#›</a:t>
+            </a:fld>
+            <a:endParaRPr lang="en-US"/>
+          </a:p>
+        </p:txBody>
+      </p:sp>
+    </p:spTree>
+    <p:extLst>
+      <p:ext uri="{BB962C8B-B14F-4D97-AF65-F5344CB8AC3E}">
+        <p14:creationId xmlns:p14="http://schemas.microsoft.com/office/powerpoint/2010/main" val="2737784601"/>
+      </p:ext>
+    </p:extLst>
+  </p:cSld>
+  <p:clrMap bg1="lt1" tx1="dk1" bg2="lt2" tx2="dk2" accent1="accent1" accent2="accent2" accent3="accent3" accent4="accent4" accent5="accent5" accent6="accent6" hlink="hlink" folHlink="folHlink"/>
+  <p:notesStyle>
+    <a:lvl1pPr marL="0" algn="l" defTabSz="914400" rtl="0" eaLnBrk="1" latinLnBrk="0" hangingPunct="1">
+      <a:defRPr sz="1200" kern="1200">
+        <a:solidFill>
+          <a:schemeClr val="tx1"/>
+        </a:solidFill>
+        <a:latin typeface="+mn-lt"/>
+        <a:ea typeface="+mn-ea"/>
+        <a:cs typeface="+mn-cs"/>
+      </a:defRPr>
+    </a:lvl1pPr>
+    <a:lvl2pPr marL="457200" algn="l" defTabSz="914400" rtl="0" eaLnBrk="1" latinLnBrk="0" hangingPunct="1">
+      <a:defRPr sz="1200" kern="1200">
+        <a:solidFill>
+          <a:schemeClr val="tx1"/>
+        </a:solidFill>
+        <a:latin typeface="+mn-lt"/>
+        <a:ea typeface="+mn-ea"/>
+        <a:cs typeface="+mn-cs"/>
+      </a:defRPr>
+    </a:lvl2pPr>
+    <a:lvl3pPr marL="914400" algn="l" defTabSz="914400" rtl="0" eaLnBrk="1" latinLnBrk="0" hangingPunct="1">
+      <a:defRPr sz="1200" kern="1200">
+        <a:solidFill>
+          <a:schemeClr val="tx1"/>
+        </a:solidFill>
+        <a:latin typeface="+mn-lt"/>
+        <a:ea typeface="+mn-ea"/>
+        <a:cs typeface="+mn-cs"/>
+      </a:defRPr>
+    </a:lvl3pPr>
+    <a:lvl4pPr marL="1371600" algn="l" defTabSz="914400" rtl="0" eaLnBrk="1" latinLnBrk="0" hangingPunct="1">
+      <a:defRPr sz="1200" kern="1200">
+        <a:solidFill>
+          <a:schemeClr val="tx1"/>
+        </a:solidFill>
+        <a:latin typeface="+mn-lt"/>
+        <a:ea typeface="+mn-ea"/>
+        <a:cs typeface="+mn-cs"/>
+      </a:defRPr>
+    </a:lvl4pPr>
+    <a:lvl5pPr marL="1828800" algn="l" defTabSz="914400" rtl="0" eaLnBrk="1" latinLnBrk="0" hangingPunct="1">
+      <a:defRPr sz="1200" kern="1200">
+        <a:solidFill>
+          <a:schemeClr val="tx1"/>
+        </a:solidFill>
+        <a:latin typeface="+mn-lt"/>
+        <a:ea typeface="+mn-ea"/>
+        <a:cs typeface="+mn-cs"/>
+      </a:defRPr>
+    </a:lvl5pPr>
+    <a:lvl6pPr marL="2286000" algn="l" defTabSz="914400" rtl="0" eaLnBrk="1" latinLnBrk="0" hangingPunct="1">
+      <a:defRPr sz="1200" kern="1200">
+        <a:solidFill>
+          <a:schemeClr val="tx1"/>
+        </a:solidFill>
+        <a:latin typeface="+mn-lt"/>
+        <a:ea typeface="+mn-ea"/>
+        <a:cs typeface="+mn-cs"/>
+      </a:defRPr>
+    </a:lvl6pPr>
+    <a:lvl7pPr marL="2743200" algn="l" defTabSz="914400" rtl="0" eaLnBrk="1" latinLnBrk="0" hangingPunct="1">
+      <a:defRPr sz="1200" kern="1200">
+        <a:solidFill>
+          <a:schemeClr val="tx1"/>
+        </a:solidFill>
+        <a:latin typeface="+mn-lt"/>
+        <a:ea typeface="+mn-ea"/>
+        <a:cs typeface="+mn-cs"/>
+      </a:defRPr>
+    </a:lvl7pPr>
+    <a:lvl8pPr marL="3200400" algn="l" defTabSz="914400" rtl="0" eaLnBrk="1" latinLnBrk="0" hangingPunct="1">
+      <a:defRPr sz="1200" kern="1200">
+        <a:solidFill>
+          <a:schemeClr val="tx1"/>
+        </a:solidFill>
+        <a:latin typeface="+mn-lt"/>
+        <a:ea typeface="+mn-ea"/>
+        <a:cs typeface="+mn-cs"/>
+      </a:defRPr>
+    </a:lvl8pPr>
+    <a:lvl9pPr marL="3657600" algn="l" defTabSz="914400" rtl="0" eaLnBrk="1" latinLnBrk="0" hangingPunct="1">
+      <a:defRPr sz="1200" kern="1200">
+        <a:solidFill>
+          <a:schemeClr val="tx1"/>
+        </a:solidFill>
+        <a:latin typeface="+mn-lt"/>
+        <a:ea typeface="+mn-ea"/>
+        <a:cs typeface="+mn-cs"/>
+      </a:defRPr>
+    </a:lvl9pPr>
+  </p:notesStyle>
+</p:notesMaster>
 </file>
 
 <file path=ppt/slideLayouts/slideLayout1.xml><?xml version="1.0" encoding="utf-8"?>
@@ -2293,10 +2656,9 @@
           </a:lstStyle>
           <a:p>
             <a:pPr algn="l"/>
-            <a:fld id="{A5B0A250-5CC0-1746-B209-08E8B0DAE6AF}" type="datetimeFigureOut">
+            <a:fld id="{82F7210E-6E23-4A11-A037-090FA2170921}" type="datetime1">
               <a:rPr lang="en-US" smtClean="0"/>
-              <a:pPr algn="l"/>
-              <a:t>3/16/2023</a:t>
+              <a:t>3/23/2023</a:t>
             </a:fld>
             <a:endParaRPr lang="en-US" dirty="0"/>
           </a:p>
@@ -3756,9 +4118,9 @@
           <a:bodyPr/>
           <a:lstStyle/>
           <a:p>
-            <a:fld id="{A5B0A250-5CC0-1746-B209-08E8B0DAE6AF}" type="datetimeFigureOut">
+            <a:fld id="{CC3FD650-1E02-4ED6-A552-884C7FD81B9F}" type="datetime1">
               <a:rPr lang="en-US" smtClean="0"/>
-              <a:t>3/16/2023</a:t>
+              <a:t>3/23/2023</a:t>
             </a:fld>
             <a:endParaRPr lang="en-US" dirty="0"/>
           </a:p>
@@ -4686,9 +5048,9 @@
           <a:bodyPr/>
           <a:lstStyle/>
           <a:p>
-            <a:fld id="{A5B0A250-5CC0-1746-B209-08E8B0DAE6AF}" type="datetimeFigureOut">
+            <a:fld id="{4215B2E7-7A51-47FA-B38B-4F1DCC16D543}" type="datetime1">
               <a:rPr lang="en-US" smtClean="0"/>
-              <a:t>3/16/2023</a:t>
+              <a:t>3/23/2023</a:t>
             </a:fld>
             <a:endParaRPr lang="en-US"/>
           </a:p>
@@ -6143,9 +6505,9 @@
           <a:bodyPr/>
           <a:lstStyle/>
           <a:p>
-            <a:fld id="{A5B0A250-5CC0-1746-B209-08E8B0DAE6AF}" type="datetimeFigureOut">
+            <a:fld id="{EADD2096-49D2-4755-ABB0-E99F6B40D78A}" type="datetime1">
               <a:rPr lang="en-US" smtClean="0"/>
-              <a:t>3/16/2023</a:t>
+              <a:t>3/23/2023</a:t>
             </a:fld>
             <a:endParaRPr lang="en-US" dirty="0"/>
           </a:p>
@@ -8499,9 +8861,9 @@
           <a:bodyPr/>
           <a:lstStyle/>
           <a:p>
-            <a:fld id="{A5B0A250-5CC0-1746-B209-08E8B0DAE6AF}" type="datetimeFigureOut">
+            <a:fld id="{6C54024B-BE76-4006-B5EE-CA72C38432A8}" type="datetime1">
               <a:rPr lang="en-US" smtClean="0"/>
-              <a:t>3/16/2023</a:t>
+              <a:t>3/23/2023</a:t>
             </a:fld>
             <a:endParaRPr lang="en-US" dirty="0"/>
           </a:p>
@@ -9540,9 +9902,9 @@
           <a:bodyPr/>
           <a:lstStyle/>
           <a:p>
-            <a:fld id="{A5B0A250-5CC0-1746-B209-08E8B0DAE6AF}" type="datetimeFigureOut">
+            <a:fld id="{F3E048E2-8CB3-4DF1-838B-B4A4102852A5}" type="datetime1">
               <a:rPr lang="en-US" smtClean="0"/>
-              <a:t>3/16/2023</a:t>
+              <a:t>3/23/2023</a:t>
             </a:fld>
             <a:endParaRPr lang="en-US" dirty="0"/>
           </a:p>
@@ -10753,9 +11115,9 @@
           <a:bodyPr/>
           <a:lstStyle/>
           <a:p>
-            <a:fld id="{A5B0A250-5CC0-1746-B209-08E8B0DAE6AF}" type="datetimeFigureOut">
+            <a:fld id="{5F7F12A6-5EC7-4BD4-B408-82810ED8FD26}" type="datetime1">
               <a:rPr lang="en-US" smtClean="0"/>
-              <a:t>3/16/2023</a:t>
+              <a:t>3/23/2023</a:t>
             </a:fld>
             <a:endParaRPr lang="en-US" dirty="0"/>
           </a:p>
@@ -11662,9 +12024,9 @@
           <a:bodyPr/>
           <a:lstStyle/>
           <a:p>
-            <a:fld id="{A5B0A250-5CC0-1746-B209-08E8B0DAE6AF}" type="datetimeFigureOut">
+            <a:fld id="{57527A64-59DF-46E1-9982-3A3967E07317}" type="datetime1">
               <a:rPr lang="en-US" smtClean="0"/>
-              <a:t>3/16/2023</a:t>
+              <a:t>3/23/2023</a:t>
             </a:fld>
             <a:endParaRPr lang="en-US" dirty="0"/>
           </a:p>
@@ -11820,10 +12182,9 @@
           <a:bodyPr/>
           <a:lstStyle/>
           <a:p>
-            <a:fld id="{A5B0A250-5CC0-1746-B209-08E8B0DAE6AF}" type="datetimeFigureOut">
+            <a:fld id="{8478E446-CF13-4031-B265-F73A34F13ADC}" type="datetime1">
               <a:rPr lang="en-US" smtClean="0"/>
-              <a:pPr/>
-              <a:t>3/16/2023</a:t>
+              <a:t>3/23/2023</a:t>
             </a:fld>
             <a:endParaRPr lang="en-US" dirty="0"/>
           </a:p>
@@ -12804,9 +13165,9 @@
           <a:bodyPr/>
           <a:lstStyle/>
           <a:p>
-            <a:fld id="{A5B0A250-5CC0-1746-B209-08E8B0DAE6AF}" type="datetimeFigureOut">
+            <a:fld id="{4F2E4521-8A64-430C-886E-0369EB9BD13C}" type="datetime1">
               <a:rPr lang="en-US" smtClean="0"/>
-              <a:t>3/16/2023</a:t>
+              <a:t>3/23/2023</a:t>
             </a:fld>
             <a:endParaRPr lang="en-US" dirty="0"/>
           </a:p>
@@ -13866,9 +14227,9 @@
           <a:bodyPr/>
           <a:lstStyle/>
           <a:p>
-            <a:fld id="{A5B0A250-5CC0-1746-B209-08E8B0DAE6AF}" type="datetimeFigureOut">
+            <a:fld id="{E4F2DDA0-FEC6-4960-B004-8AFACC0A06F8}" type="datetime1">
               <a:rPr lang="en-US" smtClean="0"/>
-              <a:t>3/16/2023</a:t>
+              <a:t>3/23/2023</a:t>
             </a:fld>
             <a:endParaRPr lang="en-US" dirty="0"/>
           </a:p>
@@ -14153,10 +14514,9 @@
             </a:lvl1pPr>
           </a:lstStyle>
           <a:p>
-            <a:fld id="{A5B0A250-5CC0-1746-B209-08E8B0DAE6AF}" type="datetimeFigureOut">
+            <a:fld id="{037B4558-C5B1-4EAF-B877-7456DDD3D50D}" type="datetime1">
               <a:rPr lang="en-US" smtClean="0"/>
-              <a:pPr/>
-              <a:t>3/16/2023</a:t>
+              <a:t>3/23/2023</a:t>
             </a:fld>
             <a:endParaRPr lang="en-US" dirty="0"/>
           </a:p>
@@ -14276,6 +14636,7 @@
     <p:sldLayoutId id="2147483697" r:id="rId10"/>
     <p:sldLayoutId id="2147483698" r:id="rId11"/>
   </p:sldLayoutIdLst>
+  <p:hf hdr="0" ftr="0" dt="0"/>
   <p:txStyles>
     <p:titleStyle>
       <a:lvl1pPr algn="l" defTabSz="914400" rtl="0" eaLnBrk="1" latinLnBrk="0" hangingPunct="1">
@@ -15614,6 +15975,35 @@
           </a:fontRef>
         </p:style>
       </p:cxnSp>
+      <p:sp>
+        <p:nvSpPr>
+          <p:cNvPr id="4" name="Slide Number Placeholder 3">
+            <a:extLst>
+              <a:ext uri="{FF2B5EF4-FFF2-40B4-BE49-F238E27FC236}">
+                <a16:creationId xmlns:a16="http://schemas.microsoft.com/office/drawing/2014/main" id="{BBCD570A-2CAA-61C3-641D-04EFAB82DC84}"/>
+              </a:ext>
+            </a:extLst>
+          </p:cNvPr>
+          <p:cNvSpPr>
+            <a:spLocks noGrp="1"/>
+          </p:cNvSpPr>
+          <p:nvPr>
+            <p:ph type="sldNum" sz="quarter" idx="12"/>
+          </p:nvPr>
+        </p:nvSpPr>
+        <p:spPr/>
+        <p:txBody>
+          <a:bodyPr/>
+          <a:lstStyle/>
+          <a:p>
+            <a:fld id="{49ABCAEC-7D34-E549-A96E-FCEDAADBE4B0}" type="slidenum">
+              <a:rPr lang="en-US" smtClean="0"/>
+              <a:t>1</a:t>
+            </a:fld>
+            <a:endParaRPr lang="en-US" dirty="0"/>
+          </a:p>
+        </p:txBody>
+      </p:sp>
     </p:spTree>
     <p:extLst>
       <p:ext uri="{BB962C8B-B14F-4D97-AF65-F5344CB8AC3E}">
@@ -15628,6 +16018,878 @@
 </file>
 
 <file path=ppt/slides/slide2.xml><?xml version="1.0" encoding="utf-8"?>
+<p:sld xmlns:a="http://schemas.openxmlformats.org/drawingml/2006/main" xmlns:r="http://schemas.openxmlformats.org/officeDocument/2006/relationships" xmlns:p="http://schemas.openxmlformats.org/presentationml/2006/main">
+  <p:cSld>
+    <p:bg>
+      <p:bgPr>
+        <a:solidFill>
+          <a:schemeClr val="bg1"/>
+        </a:solidFill>
+        <a:effectLst/>
+      </p:bgPr>
+    </p:bg>
+    <p:spTree>
+      <p:nvGrpSpPr>
+        <p:cNvPr id="1" name=""/>
+        <p:cNvGrpSpPr/>
+        <p:nvPr/>
+      </p:nvGrpSpPr>
+      <p:grpSpPr>
+        <a:xfrm>
+          <a:off x="0" y="0"/>
+          <a:ext cx="0" cy="0"/>
+          <a:chOff x="0" y="0"/>
+          <a:chExt cx="0" cy="0"/>
+        </a:xfrm>
+      </p:grpSpPr>
+      <p:sp useBgFill="1">
+        <p:nvSpPr>
+          <p:cNvPr id="1031" name="Rectangle 1030">
+            <a:extLst>
+              <a:ext uri="{FF2B5EF4-FFF2-40B4-BE49-F238E27FC236}">
+                <a16:creationId xmlns:a16="http://schemas.microsoft.com/office/drawing/2014/main" id="{C7F2E4D6-EF46-1C43-8F3E-3620C3C83F36}"/>
+              </a:ext>
+              <a:ext uri="{C183D7F6-B498-43B3-948B-1728B52AA6E4}">
+                <adec:decorative xmlns:adec="http://schemas.microsoft.com/office/drawing/2017/decorative" val="1"/>
+              </a:ext>
+            </a:extLst>
+          </p:cNvPr>
+          <p:cNvSpPr>
+            <a:spLocks noGrp="1" noRot="1" noChangeAspect="1" noMove="1" noResize="1" noEditPoints="1" noAdjustHandles="1" noChangeArrowheads="1" noChangeShapeType="1" noTextEdit="1"/>
+          </p:cNvSpPr>
+          <p:nvPr>
+            <p:extLst>
+              <p:ext uri="{386F3935-93C4-4BCD-93E2-E3B085C9AB24}">
+                <p16:designElem xmlns:p16="http://schemas.microsoft.com/office/powerpoint/2015/main" val="1"/>
+              </p:ext>
+            </p:extLst>
+          </p:nvPr>
+        </p:nvSpPr>
+        <p:spPr>
+          <a:xfrm>
+            <a:off x="0" y="0"/>
+            <a:ext cx="12192000" cy="6858000"/>
+          </a:xfrm>
+          <a:prstGeom prst="rect">
+            <a:avLst/>
+          </a:prstGeom>
+          <a:ln>
+            <a:noFill/>
+          </a:ln>
+        </p:spPr>
+        <p:style>
+          <a:lnRef idx="2">
+            <a:schemeClr val="accent1">
+              <a:shade val="50000"/>
+            </a:schemeClr>
+          </a:lnRef>
+          <a:fillRef idx="1">
+            <a:schemeClr val="accent1"/>
+          </a:fillRef>
+          <a:effectRef idx="0">
+            <a:schemeClr val="accent1"/>
+          </a:effectRef>
+          <a:fontRef idx="minor">
+            <a:schemeClr val="lt1"/>
+          </a:fontRef>
+        </p:style>
+        <p:txBody>
+          <a:bodyPr rtlCol="0" anchor="ctr"/>
+          <a:lstStyle/>
+          <a:p>
+            <a:pPr algn="ctr"/>
+            <a:endParaRPr lang="en-US"/>
+          </a:p>
+        </p:txBody>
+      </p:sp>
+      <p:sp>
+        <p:nvSpPr>
+          <p:cNvPr id="2" name="Title 1">
+            <a:extLst>
+              <a:ext uri="{FF2B5EF4-FFF2-40B4-BE49-F238E27FC236}">
+                <a16:creationId xmlns:a16="http://schemas.microsoft.com/office/drawing/2014/main" id="{859790CD-ABB7-D5C6-ED41-3C863853BA5A}"/>
+              </a:ext>
+            </a:extLst>
+          </p:cNvPr>
+          <p:cNvSpPr>
+            <a:spLocks noGrp="1"/>
+          </p:cNvSpPr>
+          <p:nvPr>
+            <p:ph type="title"/>
+          </p:nvPr>
+        </p:nvSpPr>
+        <p:spPr>
+          <a:xfrm>
+            <a:off x="565150" y="770889"/>
+            <a:ext cx="4541445" cy="1587449"/>
+          </a:xfrm>
+        </p:spPr>
+        <p:txBody>
+          <a:bodyPr vert="horz" lIns="91440" tIns="45720" rIns="91440" bIns="45720" rtlCol="0" anchor="t">
+            <a:normAutofit/>
+          </a:bodyPr>
+          <a:lstStyle/>
+          <a:p>
+            <a:r>
+              <a:rPr lang="en-US" dirty="0"/>
+              <a:t>Diffusion Model Used</a:t>
+            </a:r>
+          </a:p>
+        </p:txBody>
+      </p:sp>
+      <p:sp>
+        <p:nvSpPr>
+          <p:cNvPr id="6" name="Title 1">
+            <a:extLst>
+              <a:ext uri="{FF2B5EF4-FFF2-40B4-BE49-F238E27FC236}">
+                <a16:creationId xmlns:a16="http://schemas.microsoft.com/office/drawing/2014/main" id="{AE2D6410-9E9B-144C-8C76-FD1675AC0F19}"/>
+              </a:ext>
+            </a:extLst>
+          </p:cNvPr>
+          <p:cNvSpPr txBox="1">
+            <a:spLocks/>
+          </p:cNvSpPr>
+          <p:nvPr/>
+        </p:nvSpPr>
+        <p:spPr>
+          <a:xfrm>
+            <a:off x="6464865" y="832012"/>
+            <a:ext cx="5457725" cy="1541148"/>
+          </a:xfrm>
+          <a:prstGeom prst="rect">
+            <a:avLst/>
+          </a:prstGeom>
+        </p:spPr>
+        <p:txBody>
+          <a:bodyPr vert="horz" lIns="91440" tIns="45720" rIns="91440" bIns="45720" rtlCol="0">
+            <a:normAutofit/>
+          </a:bodyPr>
+          <a:lstStyle>
+            <a:lvl1pPr algn="l" defTabSz="914400" rtl="0" eaLnBrk="1" latinLnBrk="0" hangingPunct="1">
+              <a:lnSpc>
+                <a:spcPct val="100000"/>
+              </a:lnSpc>
+              <a:spcBef>
+                <a:spcPct val="0"/>
+              </a:spcBef>
+              <a:buNone/>
+              <a:defRPr sz="4000" b="1" i="0" kern="1200">
+                <a:solidFill>
+                  <a:schemeClr val="tx1"/>
+                </a:solidFill>
+                <a:latin typeface="+mj-lt"/>
+                <a:ea typeface="+mj-ea"/>
+                <a:cs typeface="+mj-cs"/>
+              </a:defRPr>
+            </a:lvl1pPr>
+          </a:lstStyle>
+          <a:p>
+            <a:pPr>
+              <a:spcBef>
+                <a:spcPts val="900"/>
+              </a:spcBef>
+            </a:pPr>
+            <a:r>
+              <a:rPr lang="en-US" b="0" dirty="0">
+                <a:latin typeface="+mn-lt"/>
+                <a:ea typeface="+mn-ea"/>
+                <a:cs typeface="+mn-cs"/>
+              </a:rPr>
+              <a:t>Visualized:</a:t>
+            </a:r>
+            <a:br>
+              <a:rPr lang="en-US" b="0" dirty="0">
+                <a:latin typeface="+mn-lt"/>
+                <a:ea typeface="+mn-ea"/>
+                <a:cs typeface="+mn-cs"/>
+              </a:rPr>
+            </a:br>
+            <a:r>
+              <a:rPr lang="en-US" b="0" dirty="0">
+                <a:latin typeface="+mn-lt"/>
+                <a:ea typeface="+mn-ea"/>
+                <a:cs typeface="+mn-cs"/>
+              </a:rPr>
+              <a:t>(diff. values)</a:t>
+            </a:r>
+          </a:p>
+        </p:txBody>
+      </p:sp>
+      <p:pic>
+        <p:nvPicPr>
+          <p:cNvPr id="1026" name="Picture 2" descr="Introduction to U-Net and Res-Net for Image Segmentation | by Aditi Mittal  | Medium">
+            <a:extLst>
+              <a:ext uri="{FF2B5EF4-FFF2-40B4-BE49-F238E27FC236}">
+                <a16:creationId xmlns:a16="http://schemas.microsoft.com/office/drawing/2014/main" id="{026FF4EA-3AC7-3358-2EC3-5ECC8BDE429C}"/>
+              </a:ext>
+            </a:extLst>
+          </p:cNvPr>
+          <p:cNvPicPr>
+            <a:picLocks noChangeAspect="1" noChangeArrowheads="1"/>
+          </p:cNvPicPr>
+          <p:nvPr/>
+        </p:nvPicPr>
+        <p:blipFill>
+          <a:blip r:embed="rId2">
+            <a:extLst>
+              <a:ext uri="{28A0092B-C50C-407E-A947-70E740481C1C}">
+                <a14:useLocalDpi xmlns:a14="http://schemas.microsoft.com/office/drawing/2010/main" val="0"/>
+              </a:ext>
+            </a:extLst>
+          </a:blip>
+          <a:stretch>
+            <a:fillRect/>
+          </a:stretch>
+        </p:blipFill>
+        <p:spPr bwMode="auto">
+          <a:xfrm>
+            <a:off x="6181302" y="2549055"/>
+            <a:ext cx="4791376" cy="3186265"/>
+          </a:xfrm>
+          <a:prstGeom prst="rect">
+            <a:avLst/>
+          </a:prstGeom>
+          <a:noFill/>
+          <a:extLst>
+            <a:ext uri="{909E8E84-426E-40DD-AFC4-6F175D3DCCD1}">
+              <a14:hiddenFill xmlns:a14="http://schemas.microsoft.com/office/drawing/2010/main">
+                <a:solidFill>
+                  <a:srgbClr val="FFFFFF"/>
+                </a:solidFill>
+              </a14:hiddenFill>
+            </a:ext>
+          </a:extLst>
+        </p:spPr>
+      </p:pic>
+      <p:pic>
+        <p:nvPicPr>
+          <p:cNvPr id="5" name="Picture 4">
+            <a:extLst>
+              <a:ext uri="{FF2B5EF4-FFF2-40B4-BE49-F238E27FC236}">
+                <a16:creationId xmlns:a16="http://schemas.microsoft.com/office/drawing/2014/main" id="{5E0D89FB-2E05-0E6C-D2D1-411F0B5ECC3D}"/>
+              </a:ext>
+            </a:extLst>
+          </p:cNvPr>
+          <p:cNvPicPr>
+            <a:picLocks noChangeAspect="1"/>
+          </p:cNvPicPr>
+          <p:nvPr/>
+        </p:nvPicPr>
+        <p:blipFill>
+          <a:blip r:embed="rId3"/>
+          <a:stretch>
+            <a:fillRect/>
+          </a:stretch>
+        </p:blipFill>
+        <p:spPr>
+          <a:xfrm>
+            <a:off x="218077" y="2549055"/>
+            <a:ext cx="5560554" cy="2919291"/>
+          </a:xfrm>
+          <a:prstGeom prst="rect">
+            <a:avLst/>
+          </a:prstGeom>
+        </p:spPr>
+      </p:pic>
+      <p:grpSp>
+        <p:nvGrpSpPr>
+          <p:cNvPr id="1033" name="Group 1032">
+            <a:extLst>
+              <a:ext uri="{FF2B5EF4-FFF2-40B4-BE49-F238E27FC236}">
+                <a16:creationId xmlns:a16="http://schemas.microsoft.com/office/drawing/2014/main" id="{05ADD15B-C747-D340-BF8A-A1DD2A6A9324}"/>
+              </a:ext>
+              <a:ext uri="{C183D7F6-B498-43B3-948B-1728B52AA6E4}">
+                <adec:decorative xmlns:adec="http://schemas.microsoft.com/office/drawing/2017/decorative" val="1"/>
+              </a:ext>
+            </a:extLst>
+          </p:cNvPr>
+          <p:cNvGrpSpPr>
+            <a:grpSpLocks noGrp="1" noUngrp="1" noRot="1" noChangeAspect="1" noMove="1" noResize="1"/>
+          </p:cNvGrpSpPr>
+          <p:nvPr>
+            <p:extLst>
+              <p:ext uri="{386F3935-93C4-4BCD-93E2-E3B085C9AB24}">
+                <p16:designElem xmlns:p16="http://schemas.microsoft.com/office/powerpoint/2015/main" val="1"/>
+              </p:ext>
+            </p:extLst>
+          </p:nvPr>
+        </p:nvGrpSpPr>
+        <p:grpSpPr>
+          <a:xfrm>
+            <a:off x="10290315" y="0"/>
+            <a:ext cx="1901686" cy="4677439"/>
+            <a:chOff x="10290315" y="0"/>
+            <a:chExt cx="1901686" cy="4677439"/>
+          </a:xfrm>
+        </p:grpSpPr>
+        <p:sp>
+          <p:nvSpPr>
+            <p:cNvPr id="1034" name="Freeform 53">
+              <a:extLst>
+                <a:ext uri="{FF2B5EF4-FFF2-40B4-BE49-F238E27FC236}">
+                  <a16:creationId xmlns:a16="http://schemas.microsoft.com/office/drawing/2014/main" id="{0B0B662E-0152-FD4E-B468-3F3593C151F4}"/>
+                </a:ext>
+                <a:ext uri="{C183D7F6-B498-43B3-948B-1728B52AA6E4}">
+                  <adec:decorative xmlns:adec="http://schemas.microsoft.com/office/drawing/2017/decorative" val="1"/>
+                </a:ext>
+              </a:extLst>
+            </p:cNvPr>
+            <p:cNvSpPr/>
+            <p:nvPr>
+              <p:extLst>
+                <p:ext uri="{386F3935-93C4-4BCD-93E2-E3B085C9AB24}">
+                  <p16:designElem xmlns:p16="http://schemas.microsoft.com/office/powerpoint/2015/main" val="1"/>
+                </p:ext>
+              </p:extLst>
+            </p:nvPr>
+          </p:nvSpPr>
+          <p:spPr>
+            <a:xfrm>
+              <a:off x="10290315" y="0"/>
+              <a:ext cx="1130724" cy="565573"/>
+            </a:xfrm>
+            <a:custGeom>
+              <a:avLst/>
+              <a:gdLst>
+                <a:gd name="connsiteX0" fmla="*/ 21 w 1130724"/>
+                <a:gd name="connsiteY0" fmla="*/ 0 h 565573"/>
+                <a:gd name="connsiteX1" fmla="*/ 1130703 w 1130724"/>
+                <a:gd name="connsiteY1" fmla="*/ 0 h 565573"/>
+                <a:gd name="connsiteX2" fmla="*/ 1130724 w 1130724"/>
+                <a:gd name="connsiteY2" fmla="*/ 211 h 565573"/>
+                <a:gd name="connsiteX3" fmla="*/ 565362 w 1130724"/>
+                <a:gd name="connsiteY3" fmla="*/ 565573 h 565573"/>
+                <a:gd name="connsiteX4" fmla="*/ 0 w 1130724"/>
+                <a:gd name="connsiteY4" fmla="*/ 211 h 565573"/>
+              </a:gdLst>
+              <a:ahLst/>
+              <a:cxnLst>
+                <a:cxn ang="0">
+                  <a:pos x="connsiteX0" y="connsiteY0"/>
+                </a:cxn>
+                <a:cxn ang="0">
+                  <a:pos x="connsiteX1" y="connsiteY1"/>
+                </a:cxn>
+                <a:cxn ang="0">
+                  <a:pos x="connsiteX2" y="connsiteY2"/>
+                </a:cxn>
+                <a:cxn ang="0">
+                  <a:pos x="connsiteX3" y="connsiteY3"/>
+                </a:cxn>
+                <a:cxn ang="0">
+                  <a:pos x="connsiteX4" y="connsiteY4"/>
+                </a:cxn>
+              </a:cxnLst>
+              <a:rect l="l" t="t" r="r" b="b"/>
+              <a:pathLst>
+                <a:path w="1130724" h="565573">
+                  <a:moveTo>
+                    <a:pt x="21" y="0"/>
+                  </a:moveTo>
+                  <a:lnTo>
+                    <a:pt x="1130703" y="0"/>
+                  </a:lnTo>
+                  <a:lnTo>
+                    <a:pt x="1130724" y="211"/>
+                  </a:lnTo>
+                  <a:cubicBezTo>
+                    <a:pt x="1130724" y="312452"/>
+                    <a:pt x="877603" y="565573"/>
+                    <a:pt x="565362" y="565573"/>
+                  </a:cubicBezTo>
+                  <a:cubicBezTo>
+                    <a:pt x="253121" y="565573"/>
+                    <a:pt x="0" y="312452"/>
+                    <a:pt x="0" y="211"/>
+                  </a:cubicBezTo>
+                  <a:close/>
+                </a:path>
+              </a:pathLst>
+            </a:custGeom>
+            <a:solidFill>
+              <a:schemeClr val="bg2"/>
+            </a:solidFill>
+            <a:ln>
+              <a:noFill/>
+            </a:ln>
+          </p:spPr>
+          <p:style>
+            <a:lnRef idx="2">
+              <a:schemeClr val="accent1">
+                <a:shade val="50000"/>
+              </a:schemeClr>
+            </a:lnRef>
+            <a:fillRef idx="1">
+              <a:schemeClr val="accent1"/>
+            </a:fillRef>
+            <a:effectRef idx="0">
+              <a:schemeClr val="accent1"/>
+            </a:effectRef>
+            <a:fontRef idx="minor">
+              <a:schemeClr val="lt1"/>
+            </a:fontRef>
+          </p:style>
+          <p:txBody>
+            <a:bodyPr wrap="square" rtlCol="0" anchor="ctr">
+              <a:noAutofit/>
+            </a:bodyPr>
+            <a:lstStyle/>
+            <a:p>
+              <a:pPr algn="ctr"/>
+              <a:endParaRPr lang="en-US"/>
+            </a:p>
+          </p:txBody>
+        </p:sp>
+        <p:sp>
+          <p:nvSpPr>
+            <p:cNvPr id="1035" name="Freeform 55">
+              <a:extLst>
+                <a:ext uri="{FF2B5EF4-FFF2-40B4-BE49-F238E27FC236}">
+                  <a16:creationId xmlns:a16="http://schemas.microsoft.com/office/drawing/2014/main" id="{81BFFC99-6B9D-F240-BD39-160F4C5735BB}"/>
+                </a:ext>
+                <a:ext uri="{C183D7F6-B498-43B3-948B-1728B52AA6E4}">
+                  <adec:decorative xmlns:adec="http://schemas.microsoft.com/office/drawing/2017/decorative" val="1"/>
+                </a:ext>
+              </a:extLst>
+            </p:cNvPr>
+            <p:cNvSpPr/>
+            <p:nvPr>
+              <p:extLst>
+                <p:ext uri="{386F3935-93C4-4BCD-93E2-E3B085C9AB24}">
+                  <p16:designElem xmlns:p16="http://schemas.microsoft.com/office/powerpoint/2015/main" val="1"/>
+                </p:ext>
+              </p:extLst>
+            </p:nvPr>
+          </p:nvSpPr>
+          <p:spPr>
+            <a:xfrm>
+              <a:off x="11653180" y="3552066"/>
+              <a:ext cx="538821" cy="1125373"/>
+            </a:xfrm>
+            <a:custGeom>
+              <a:avLst/>
+              <a:gdLst>
+                <a:gd name="connsiteX0" fmla="*/ 538821 w 538821"/>
+                <a:gd name="connsiteY0" fmla="*/ 0 h 1125373"/>
+                <a:gd name="connsiteX1" fmla="*/ 538821 w 538821"/>
+                <a:gd name="connsiteY1" fmla="*/ 1125373 h 1125373"/>
+                <a:gd name="connsiteX2" fmla="*/ 451422 w 538821"/>
+                <a:gd name="connsiteY2" fmla="*/ 1116562 h 1125373"/>
+                <a:gd name="connsiteX3" fmla="*/ 0 w 538821"/>
+                <a:gd name="connsiteY3" fmla="*/ 562686 h 1125373"/>
+                <a:gd name="connsiteX4" fmla="*/ 451422 w 538821"/>
+                <a:gd name="connsiteY4" fmla="*/ 8810 h 1125373"/>
+              </a:gdLst>
+              <a:ahLst/>
+              <a:cxnLst>
+                <a:cxn ang="0">
+                  <a:pos x="connsiteX0" y="connsiteY0"/>
+                </a:cxn>
+                <a:cxn ang="0">
+                  <a:pos x="connsiteX1" y="connsiteY1"/>
+                </a:cxn>
+                <a:cxn ang="0">
+                  <a:pos x="connsiteX2" y="connsiteY2"/>
+                </a:cxn>
+                <a:cxn ang="0">
+                  <a:pos x="connsiteX3" y="connsiteY3"/>
+                </a:cxn>
+                <a:cxn ang="0">
+                  <a:pos x="connsiteX4" y="connsiteY4"/>
+                </a:cxn>
+              </a:cxnLst>
+              <a:rect l="l" t="t" r="r" b="b"/>
+              <a:pathLst>
+                <a:path w="538821" h="1125373">
+                  <a:moveTo>
+                    <a:pt x="538821" y="0"/>
+                  </a:moveTo>
+                  <a:lnTo>
+                    <a:pt x="538821" y="1125373"/>
+                  </a:lnTo>
+                  <a:lnTo>
+                    <a:pt x="451422" y="1116562"/>
+                  </a:lnTo>
+                  <a:cubicBezTo>
+                    <a:pt x="193796" y="1063844"/>
+                    <a:pt x="0" y="835897"/>
+                    <a:pt x="0" y="562686"/>
+                  </a:cubicBezTo>
+                  <a:cubicBezTo>
+                    <a:pt x="0" y="289475"/>
+                    <a:pt x="193796" y="61528"/>
+                    <a:pt x="451422" y="8810"/>
+                  </a:cubicBezTo>
+                  <a:close/>
+                </a:path>
+              </a:pathLst>
+            </a:custGeom>
+            <a:solidFill>
+              <a:schemeClr val="bg2"/>
+            </a:solidFill>
+            <a:ln>
+              <a:noFill/>
+            </a:ln>
+          </p:spPr>
+          <p:style>
+            <a:lnRef idx="2">
+              <a:schemeClr val="accent1">
+                <a:shade val="50000"/>
+              </a:schemeClr>
+            </a:lnRef>
+            <a:fillRef idx="1">
+              <a:schemeClr val="accent1"/>
+            </a:fillRef>
+            <a:effectRef idx="0">
+              <a:schemeClr val="accent1"/>
+            </a:effectRef>
+            <a:fontRef idx="minor">
+              <a:schemeClr val="lt1"/>
+            </a:fontRef>
+          </p:style>
+          <p:txBody>
+            <a:bodyPr wrap="square" rtlCol="0" anchor="ctr">
+              <a:noAutofit/>
+            </a:bodyPr>
+            <a:lstStyle/>
+            <a:p>
+              <a:pPr algn="ctr"/>
+              <a:endParaRPr lang="en-US"/>
+            </a:p>
+          </p:txBody>
+        </p:sp>
+        <p:sp>
+          <p:nvSpPr>
+            <p:cNvPr id="1036" name="Freeform 57">
+              <a:extLst>
+                <a:ext uri="{FF2B5EF4-FFF2-40B4-BE49-F238E27FC236}">
+                  <a16:creationId xmlns:a16="http://schemas.microsoft.com/office/drawing/2014/main" id="{4DC6AEB9-EEFF-D243-AEE2-42D0F9E53B54}"/>
+                </a:ext>
+                <a:ext uri="{C183D7F6-B498-43B3-948B-1728B52AA6E4}">
+                  <adec:decorative xmlns:adec="http://schemas.microsoft.com/office/drawing/2017/decorative" val="1"/>
+                </a:ext>
+              </a:extLst>
+            </p:cNvPr>
+            <p:cNvSpPr/>
+            <p:nvPr>
+              <p:extLst>
+                <p:ext uri="{386F3935-93C4-4BCD-93E2-E3B085C9AB24}">
+                  <p16:designElem xmlns:p16="http://schemas.microsoft.com/office/powerpoint/2015/main" val="1"/>
+                </p:ext>
+              </p:extLst>
+            </p:nvPr>
+          </p:nvSpPr>
+          <p:spPr>
+            <a:xfrm>
+              <a:off x="11653180" y="809039"/>
+              <a:ext cx="538821" cy="1125373"/>
+            </a:xfrm>
+            <a:custGeom>
+              <a:avLst/>
+              <a:gdLst>
+                <a:gd name="connsiteX0" fmla="*/ 538821 w 538821"/>
+                <a:gd name="connsiteY0" fmla="*/ 0 h 1125373"/>
+                <a:gd name="connsiteX1" fmla="*/ 538821 w 538821"/>
+                <a:gd name="connsiteY1" fmla="*/ 1125373 h 1125373"/>
+                <a:gd name="connsiteX2" fmla="*/ 451422 w 538821"/>
+                <a:gd name="connsiteY2" fmla="*/ 1116562 h 1125373"/>
+                <a:gd name="connsiteX3" fmla="*/ 0 w 538821"/>
+                <a:gd name="connsiteY3" fmla="*/ 562686 h 1125373"/>
+                <a:gd name="connsiteX4" fmla="*/ 451422 w 538821"/>
+                <a:gd name="connsiteY4" fmla="*/ 8810 h 1125373"/>
+              </a:gdLst>
+              <a:ahLst/>
+              <a:cxnLst>
+                <a:cxn ang="0">
+                  <a:pos x="connsiteX0" y="connsiteY0"/>
+                </a:cxn>
+                <a:cxn ang="0">
+                  <a:pos x="connsiteX1" y="connsiteY1"/>
+                </a:cxn>
+                <a:cxn ang="0">
+                  <a:pos x="connsiteX2" y="connsiteY2"/>
+                </a:cxn>
+                <a:cxn ang="0">
+                  <a:pos x="connsiteX3" y="connsiteY3"/>
+                </a:cxn>
+                <a:cxn ang="0">
+                  <a:pos x="connsiteX4" y="connsiteY4"/>
+                </a:cxn>
+              </a:cxnLst>
+              <a:rect l="l" t="t" r="r" b="b"/>
+              <a:pathLst>
+                <a:path w="538821" h="1125373">
+                  <a:moveTo>
+                    <a:pt x="538821" y="0"/>
+                  </a:moveTo>
+                  <a:lnTo>
+                    <a:pt x="538821" y="1125373"/>
+                  </a:lnTo>
+                  <a:lnTo>
+                    <a:pt x="451422" y="1116562"/>
+                  </a:lnTo>
+                  <a:cubicBezTo>
+                    <a:pt x="193796" y="1063844"/>
+                    <a:pt x="0" y="835897"/>
+                    <a:pt x="0" y="562686"/>
+                  </a:cubicBezTo>
+                  <a:cubicBezTo>
+                    <a:pt x="0" y="289475"/>
+                    <a:pt x="193796" y="61528"/>
+                    <a:pt x="451422" y="8810"/>
+                  </a:cubicBezTo>
+                  <a:close/>
+                </a:path>
+              </a:pathLst>
+            </a:custGeom>
+            <a:solidFill>
+              <a:schemeClr val="accent1"/>
+            </a:solidFill>
+            <a:ln>
+              <a:noFill/>
+            </a:ln>
+          </p:spPr>
+          <p:style>
+            <a:lnRef idx="2">
+              <a:schemeClr val="accent1">
+                <a:shade val="50000"/>
+              </a:schemeClr>
+            </a:lnRef>
+            <a:fillRef idx="1">
+              <a:schemeClr val="accent1"/>
+            </a:fillRef>
+            <a:effectRef idx="0">
+              <a:schemeClr val="accent1"/>
+            </a:effectRef>
+            <a:fontRef idx="minor">
+              <a:schemeClr val="lt1"/>
+            </a:fontRef>
+          </p:style>
+          <p:txBody>
+            <a:bodyPr wrap="square" rtlCol="0" anchor="ctr">
+              <a:noAutofit/>
+            </a:bodyPr>
+            <a:lstStyle/>
+            <a:p>
+              <a:pPr algn="ctr"/>
+              <a:endParaRPr lang="en-US"/>
+            </a:p>
+          </p:txBody>
+        </p:sp>
+        <p:sp>
+          <p:nvSpPr>
+            <p:cNvPr id="1037" name="Freeform 58">
+              <a:extLst>
+                <a:ext uri="{FF2B5EF4-FFF2-40B4-BE49-F238E27FC236}">
+                  <a16:creationId xmlns:a16="http://schemas.microsoft.com/office/drawing/2014/main" id="{D89DA958-651D-0049-A549-A9D22E4941F4}"/>
+                </a:ext>
+                <a:ext uri="{C183D7F6-B498-43B3-948B-1728B52AA6E4}">
+                  <adec:decorative xmlns:adec="http://schemas.microsoft.com/office/drawing/2017/decorative" val="1"/>
+                </a:ext>
+              </a:extLst>
+            </p:cNvPr>
+            <p:cNvSpPr/>
+            <p:nvPr>
+              <p:extLst>
+                <p:ext uri="{386F3935-93C4-4BCD-93E2-E3B085C9AB24}">
+                  <p16:designElem xmlns:p16="http://schemas.microsoft.com/office/powerpoint/2015/main" val="1"/>
+                </p:ext>
+              </p:extLst>
+            </p:nvPr>
+          </p:nvSpPr>
+          <p:spPr>
+            <a:xfrm>
+              <a:off x="11653180" y="0"/>
+              <a:ext cx="538821" cy="562898"/>
+            </a:xfrm>
+            <a:custGeom>
+              <a:avLst/>
+              <a:gdLst>
+                <a:gd name="connsiteX0" fmla="*/ 21 w 538821"/>
+                <a:gd name="connsiteY0" fmla="*/ 0 h 562898"/>
+                <a:gd name="connsiteX1" fmla="*/ 538821 w 538821"/>
+                <a:gd name="connsiteY1" fmla="*/ 0 h 562898"/>
+                <a:gd name="connsiteX2" fmla="*/ 538821 w 538821"/>
+                <a:gd name="connsiteY2" fmla="*/ 562898 h 562898"/>
+                <a:gd name="connsiteX3" fmla="*/ 451422 w 538821"/>
+                <a:gd name="connsiteY3" fmla="*/ 554087 h 562898"/>
+                <a:gd name="connsiteX4" fmla="*/ 0 w 538821"/>
+                <a:gd name="connsiteY4" fmla="*/ 211 h 562898"/>
+              </a:gdLst>
+              <a:ahLst/>
+              <a:cxnLst>
+                <a:cxn ang="0">
+                  <a:pos x="connsiteX0" y="connsiteY0"/>
+                </a:cxn>
+                <a:cxn ang="0">
+                  <a:pos x="connsiteX1" y="connsiteY1"/>
+                </a:cxn>
+                <a:cxn ang="0">
+                  <a:pos x="connsiteX2" y="connsiteY2"/>
+                </a:cxn>
+                <a:cxn ang="0">
+                  <a:pos x="connsiteX3" y="connsiteY3"/>
+                </a:cxn>
+                <a:cxn ang="0">
+                  <a:pos x="connsiteX4" y="connsiteY4"/>
+                </a:cxn>
+              </a:cxnLst>
+              <a:rect l="l" t="t" r="r" b="b"/>
+              <a:pathLst>
+                <a:path w="538821" h="562898">
+                  <a:moveTo>
+                    <a:pt x="21" y="0"/>
+                  </a:moveTo>
+                  <a:lnTo>
+                    <a:pt x="538821" y="0"/>
+                  </a:lnTo>
+                  <a:lnTo>
+                    <a:pt x="538821" y="562898"/>
+                  </a:lnTo>
+                  <a:lnTo>
+                    <a:pt x="451422" y="554087"/>
+                  </a:lnTo>
+                  <a:cubicBezTo>
+                    <a:pt x="193796" y="501369"/>
+                    <a:pt x="0" y="273422"/>
+                    <a:pt x="0" y="211"/>
+                  </a:cubicBezTo>
+                  <a:close/>
+                </a:path>
+              </a:pathLst>
+            </a:custGeom>
+            <a:solidFill>
+              <a:schemeClr val="bg2"/>
+            </a:solidFill>
+            <a:ln>
+              <a:noFill/>
+            </a:ln>
+          </p:spPr>
+          <p:style>
+            <a:lnRef idx="2">
+              <a:schemeClr val="accent1">
+                <a:shade val="50000"/>
+              </a:schemeClr>
+            </a:lnRef>
+            <a:fillRef idx="1">
+              <a:schemeClr val="accent1"/>
+            </a:fillRef>
+            <a:effectRef idx="0">
+              <a:schemeClr val="accent1"/>
+            </a:effectRef>
+            <a:fontRef idx="minor">
+              <a:schemeClr val="lt1"/>
+            </a:fontRef>
+          </p:style>
+          <p:txBody>
+            <a:bodyPr wrap="square" rtlCol="0" anchor="ctr">
+              <a:noAutofit/>
+            </a:bodyPr>
+            <a:lstStyle/>
+            <a:p>
+              <a:pPr algn="ctr"/>
+              <a:endParaRPr lang="en-US"/>
+            </a:p>
+          </p:txBody>
+        </p:sp>
+      </p:grpSp>
+      <p:cxnSp>
+        <p:nvCxnSpPr>
+          <p:cNvPr id="1039" name="Straight Connector 1038">
+            <a:extLst>
+              <a:ext uri="{FF2B5EF4-FFF2-40B4-BE49-F238E27FC236}">
+                <a16:creationId xmlns:a16="http://schemas.microsoft.com/office/drawing/2014/main" id="{1FE039F1-6D47-C642-B506-452A83B0AB11}"/>
+              </a:ext>
+              <a:ext uri="{C183D7F6-B498-43B3-948B-1728B52AA6E4}">
+                <adec:decorative xmlns:adec="http://schemas.microsoft.com/office/drawing/2017/decorative" val="1"/>
+              </a:ext>
+            </a:extLst>
+          </p:cNvPr>
+          <p:cNvCxnSpPr>
+            <a:cxnSpLocks noGrp="1" noRot="1" noChangeAspect="1" noMove="1" noResize="1" noEditPoints="1" noAdjustHandles="1" noChangeArrowheads="1" noChangeShapeType="1"/>
+          </p:cNvCxnSpPr>
+          <p:nvPr>
+            <p:extLst>
+              <p:ext uri="{386F3935-93C4-4BCD-93E2-E3B085C9AB24}">
+                <p16:designElem xmlns:p16="http://schemas.microsoft.com/office/powerpoint/2015/main" val="1"/>
+              </p:ext>
+            </p:extLst>
+          </p:nvPr>
+        </p:nvCxnSpPr>
+        <p:spPr>
+          <a:xfrm>
+            <a:off x="565150" y="6087110"/>
+            <a:ext cx="11058344" cy="0"/>
+          </a:xfrm>
+          <a:prstGeom prst="line">
+            <a:avLst/>
+          </a:prstGeom>
+          <a:ln w="12700">
+            <a:solidFill>
+              <a:schemeClr val="bg1">
+                <a:lumMod val="65000"/>
+              </a:schemeClr>
+            </a:solidFill>
+          </a:ln>
+        </p:spPr>
+        <p:style>
+          <a:lnRef idx="1">
+            <a:schemeClr val="accent1"/>
+          </a:lnRef>
+          <a:fillRef idx="0">
+            <a:schemeClr val="accent1"/>
+          </a:fillRef>
+          <a:effectRef idx="0">
+            <a:schemeClr val="accent1"/>
+          </a:effectRef>
+          <a:fontRef idx="minor">
+            <a:schemeClr val="tx1"/>
+          </a:fontRef>
+        </p:style>
+      </p:cxnSp>
+      <p:sp>
+        <p:nvSpPr>
+          <p:cNvPr id="7" name="Slide Number Placeholder 6">
+            <a:extLst>
+              <a:ext uri="{FF2B5EF4-FFF2-40B4-BE49-F238E27FC236}">
+                <a16:creationId xmlns:a16="http://schemas.microsoft.com/office/drawing/2014/main" id="{6D08F700-9428-DD35-08B9-61434F900DA3}"/>
+              </a:ext>
+            </a:extLst>
+          </p:cNvPr>
+          <p:cNvSpPr>
+            <a:spLocks noGrp="1"/>
+          </p:cNvSpPr>
+          <p:nvPr>
+            <p:ph type="sldNum" sz="quarter" idx="12"/>
+          </p:nvPr>
+        </p:nvSpPr>
+        <p:spPr/>
+        <p:txBody>
+          <a:bodyPr/>
+          <a:lstStyle/>
+          <a:p>
+            <a:fld id="{49ABCAEC-7D34-E549-A96E-FCEDAADBE4B0}" type="slidenum">
+              <a:rPr lang="en-US" smtClean="0"/>
+              <a:t>2</a:t>
+            </a:fld>
+            <a:endParaRPr lang="en-US"/>
+          </a:p>
+        </p:txBody>
+      </p:sp>
+    </p:spTree>
+    <p:extLst>
+      <p:ext uri="{BB962C8B-B14F-4D97-AF65-F5344CB8AC3E}">
+        <p14:creationId xmlns:p14="http://schemas.microsoft.com/office/powerpoint/2010/main" val="3007818029"/>
+      </p:ext>
+    </p:extLst>
+  </p:cSld>
+  <p:clrMapOvr>
+    <a:masterClrMapping/>
+  </p:clrMapOvr>
+</p:sld>
+</file>
+
+<file path=ppt/slides/slide3.xml><?xml version="1.0" encoding="utf-8"?>
 <p:sld xmlns:a="http://schemas.openxmlformats.org/drawingml/2006/main" xmlns:r="http://schemas.openxmlformats.org/officeDocument/2006/relationships" xmlns:p="http://schemas.openxmlformats.org/presentationml/2006/main">
   <p:cSld>
     <p:spTree>
@@ -15662,10 +16924,691 @@
         </p:nvSpPr>
         <p:spPr/>
         <p:txBody>
+          <a:bodyPr>
+            <a:normAutofit/>
+          </a:bodyPr>
+          <a:lstStyle/>
+          <a:p>
+            <a:r>
+              <a:rPr lang="en-US" dirty="0"/>
+              <a:t>Images Used: 10</a:t>
+            </a:r>
+          </a:p>
+        </p:txBody>
+      </p:sp>
+      <p:pic>
+        <p:nvPicPr>
+          <p:cNvPr id="6" name="Picture 5">
+            <a:extLst>
+              <a:ext uri="{FF2B5EF4-FFF2-40B4-BE49-F238E27FC236}">
+                <a16:creationId xmlns:a16="http://schemas.microsoft.com/office/drawing/2014/main" id="{3044F56D-ED1A-A76A-F8C5-FF67434901C4}"/>
+              </a:ext>
+            </a:extLst>
+          </p:cNvPr>
+          <p:cNvPicPr>
+            <a:picLocks noChangeAspect="1"/>
+          </p:cNvPicPr>
+          <p:nvPr/>
+        </p:nvPicPr>
+        <p:blipFill>
+          <a:blip r:embed="rId2"/>
+          <a:stretch>
+            <a:fillRect/>
+          </a:stretch>
+        </p:blipFill>
+        <p:spPr>
+          <a:xfrm>
+            <a:off x="415406" y="1634679"/>
+            <a:ext cx="11361188" cy="3851719"/>
+          </a:xfrm>
+          <a:prstGeom prst="rect">
+            <a:avLst/>
+          </a:prstGeom>
+        </p:spPr>
+      </p:pic>
+      <p:sp>
+        <p:nvSpPr>
+          <p:cNvPr id="7" name="Slide Number Placeholder 6">
+            <a:extLst>
+              <a:ext uri="{FF2B5EF4-FFF2-40B4-BE49-F238E27FC236}">
+                <a16:creationId xmlns:a16="http://schemas.microsoft.com/office/drawing/2014/main" id="{75D30345-5ED6-5EE7-FA65-4DE1B5573CA4}"/>
+              </a:ext>
+            </a:extLst>
+          </p:cNvPr>
+          <p:cNvSpPr>
+            <a:spLocks noGrp="1"/>
+          </p:cNvSpPr>
+          <p:nvPr>
+            <p:ph type="sldNum" sz="quarter" idx="12"/>
+          </p:nvPr>
+        </p:nvSpPr>
+        <p:spPr/>
+        <p:txBody>
           <a:bodyPr/>
           <a:lstStyle/>
           <a:p>
-            <a:endParaRPr lang="en-US" dirty="0"/>
+            <a:fld id="{49ABCAEC-7D34-E549-A96E-FCEDAADBE4B0}" type="slidenum">
+              <a:rPr lang="en-US" smtClean="0"/>
+              <a:t>3</a:t>
+            </a:fld>
+            <a:endParaRPr lang="en-US"/>
+          </a:p>
+        </p:txBody>
+      </p:sp>
+    </p:spTree>
+    <p:extLst>
+      <p:ext uri="{BB962C8B-B14F-4D97-AF65-F5344CB8AC3E}">
+        <p14:creationId xmlns:p14="http://schemas.microsoft.com/office/powerpoint/2010/main" val="1714458700"/>
+      </p:ext>
+    </p:extLst>
+  </p:cSld>
+  <p:clrMapOvr>
+    <a:masterClrMapping/>
+  </p:clrMapOvr>
+</p:sld>
+</file>
+
+<file path=ppt/slides/slide4.xml><?xml version="1.0" encoding="utf-8"?>
+<p:sld xmlns:a="http://schemas.openxmlformats.org/drawingml/2006/main" xmlns:r="http://schemas.openxmlformats.org/officeDocument/2006/relationships" xmlns:p="http://schemas.openxmlformats.org/presentationml/2006/main">
+  <p:cSld>
+    <p:spTree>
+      <p:nvGrpSpPr>
+        <p:cNvPr id="1" name=""/>
+        <p:cNvGrpSpPr/>
+        <p:nvPr/>
+      </p:nvGrpSpPr>
+      <p:grpSpPr>
+        <a:xfrm>
+          <a:off x="0" y="0"/>
+          <a:ext cx="0" cy="0"/>
+          <a:chOff x="0" y="0"/>
+          <a:chExt cx="0" cy="0"/>
+        </a:xfrm>
+      </p:grpSpPr>
+      <p:sp>
+        <p:nvSpPr>
+          <p:cNvPr id="2" name="Title 1">
+            <a:extLst>
+              <a:ext uri="{FF2B5EF4-FFF2-40B4-BE49-F238E27FC236}">
+                <a16:creationId xmlns:a16="http://schemas.microsoft.com/office/drawing/2014/main" id="{859790CD-ABB7-D5C6-ED41-3C863853BA5A}"/>
+              </a:ext>
+            </a:extLst>
+          </p:cNvPr>
+          <p:cNvSpPr>
+            <a:spLocks noGrp="1"/>
+          </p:cNvSpPr>
+          <p:nvPr>
+            <p:ph type="title"/>
+          </p:nvPr>
+        </p:nvSpPr>
+        <p:spPr/>
+        <p:txBody>
+          <a:bodyPr>
+            <a:normAutofit/>
+          </a:bodyPr>
+          <a:lstStyle/>
+          <a:p>
+            <a:r>
+              <a:rPr lang="en-US" dirty="0"/>
+              <a:t>Augmentation Used:</a:t>
+            </a:r>
+          </a:p>
+        </p:txBody>
+      </p:sp>
+      <p:pic>
+        <p:nvPicPr>
+          <p:cNvPr id="4" name="Picture 3">
+            <a:extLst>
+              <a:ext uri="{FF2B5EF4-FFF2-40B4-BE49-F238E27FC236}">
+                <a16:creationId xmlns:a16="http://schemas.microsoft.com/office/drawing/2014/main" id="{D9B1927D-0FFD-136F-3F70-0D52C151DFCE}"/>
+              </a:ext>
+            </a:extLst>
+          </p:cNvPr>
+          <p:cNvPicPr>
+            <a:picLocks noChangeAspect="1"/>
+          </p:cNvPicPr>
+          <p:nvPr/>
+        </p:nvPicPr>
+        <p:blipFill>
+          <a:blip r:embed="rId2"/>
+          <a:stretch>
+            <a:fillRect/>
+          </a:stretch>
+        </p:blipFill>
+        <p:spPr>
+          <a:xfrm>
+            <a:off x="121925" y="1781894"/>
+            <a:ext cx="11415079" cy="1449235"/>
+          </a:xfrm>
+          <a:prstGeom prst="rect">
+            <a:avLst/>
+          </a:prstGeom>
+        </p:spPr>
+      </p:pic>
+      <p:pic>
+        <p:nvPicPr>
+          <p:cNvPr id="7" name="Picture 6">
+            <a:extLst>
+              <a:ext uri="{FF2B5EF4-FFF2-40B4-BE49-F238E27FC236}">
+                <a16:creationId xmlns:a16="http://schemas.microsoft.com/office/drawing/2014/main" id="{190F9A71-3C44-D022-3689-C43D9634FAF8}"/>
+              </a:ext>
+            </a:extLst>
+          </p:cNvPr>
+          <p:cNvPicPr>
+            <a:picLocks noChangeAspect="1"/>
+          </p:cNvPicPr>
+          <p:nvPr/>
+        </p:nvPicPr>
+        <p:blipFill>
+          <a:blip r:embed="rId3"/>
+          <a:stretch>
+            <a:fillRect/>
+          </a:stretch>
+        </p:blipFill>
+        <p:spPr>
+          <a:xfrm>
+            <a:off x="121925" y="3429000"/>
+            <a:ext cx="6053415" cy="2144313"/>
+          </a:xfrm>
+          <a:prstGeom prst="rect">
+            <a:avLst/>
+          </a:prstGeom>
+        </p:spPr>
+      </p:pic>
+      <p:sp>
+        <p:nvSpPr>
+          <p:cNvPr id="8" name="Slide Number Placeholder 7">
+            <a:extLst>
+              <a:ext uri="{FF2B5EF4-FFF2-40B4-BE49-F238E27FC236}">
+                <a16:creationId xmlns:a16="http://schemas.microsoft.com/office/drawing/2014/main" id="{A14C43AC-FEDA-EDD1-9362-6880B89C21CE}"/>
+              </a:ext>
+            </a:extLst>
+          </p:cNvPr>
+          <p:cNvSpPr>
+            <a:spLocks noGrp="1"/>
+          </p:cNvSpPr>
+          <p:nvPr>
+            <p:ph type="sldNum" sz="quarter" idx="12"/>
+          </p:nvPr>
+        </p:nvSpPr>
+        <p:spPr/>
+        <p:txBody>
+          <a:bodyPr/>
+          <a:lstStyle/>
+          <a:p>
+            <a:fld id="{49ABCAEC-7D34-E549-A96E-FCEDAADBE4B0}" type="slidenum">
+              <a:rPr lang="en-US" smtClean="0"/>
+              <a:t>4</a:t>
+            </a:fld>
+            <a:endParaRPr lang="en-US"/>
+          </a:p>
+        </p:txBody>
+      </p:sp>
+    </p:spTree>
+    <p:extLst>
+      <p:ext uri="{BB962C8B-B14F-4D97-AF65-F5344CB8AC3E}">
+        <p14:creationId xmlns:p14="http://schemas.microsoft.com/office/powerpoint/2010/main" val="1331065715"/>
+      </p:ext>
+    </p:extLst>
+  </p:cSld>
+  <p:clrMapOvr>
+    <a:masterClrMapping/>
+  </p:clrMapOvr>
+</p:sld>
+</file>
+
+<file path=ppt/slides/slide5.xml><?xml version="1.0" encoding="utf-8"?>
+<p:sld xmlns:a="http://schemas.openxmlformats.org/drawingml/2006/main" xmlns:r="http://schemas.openxmlformats.org/officeDocument/2006/relationships" xmlns:p="http://schemas.openxmlformats.org/presentationml/2006/main">
+  <p:cSld>
+    <p:spTree>
+      <p:nvGrpSpPr>
+        <p:cNvPr id="1" name=""/>
+        <p:cNvGrpSpPr/>
+        <p:nvPr/>
+      </p:nvGrpSpPr>
+      <p:grpSpPr>
+        <a:xfrm>
+          <a:off x="0" y="0"/>
+          <a:ext cx="0" cy="0"/>
+          <a:chOff x="0" y="0"/>
+          <a:chExt cx="0" cy="0"/>
+        </a:xfrm>
+      </p:grpSpPr>
+      <p:sp>
+        <p:nvSpPr>
+          <p:cNvPr id="2" name="Title 1">
+            <a:extLst>
+              <a:ext uri="{FF2B5EF4-FFF2-40B4-BE49-F238E27FC236}">
+                <a16:creationId xmlns:a16="http://schemas.microsoft.com/office/drawing/2014/main" id="{859790CD-ABB7-D5C6-ED41-3C863853BA5A}"/>
+              </a:ext>
+            </a:extLst>
+          </p:cNvPr>
+          <p:cNvSpPr>
+            <a:spLocks noGrp="1"/>
+          </p:cNvSpPr>
+          <p:nvPr>
+            <p:ph type="title"/>
+          </p:nvPr>
+        </p:nvSpPr>
+        <p:spPr/>
+        <p:txBody>
+          <a:bodyPr>
+            <a:normAutofit/>
+          </a:bodyPr>
+          <a:lstStyle/>
+          <a:p>
+            <a:r>
+              <a:rPr lang="en-US" dirty="0"/>
+              <a:t>Training Configuration Used:</a:t>
+            </a:r>
+          </a:p>
+        </p:txBody>
+      </p:sp>
+      <p:pic>
+        <p:nvPicPr>
+          <p:cNvPr id="5" name="Picture 4">
+            <a:extLst>
+              <a:ext uri="{FF2B5EF4-FFF2-40B4-BE49-F238E27FC236}">
+                <a16:creationId xmlns:a16="http://schemas.microsoft.com/office/drawing/2014/main" id="{2005F0F0-89BC-FF88-DA60-D20D13DE2CD0}"/>
+              </a:ext>
+            </a:extLst>
+          </p:cNvPr>
+          <p:cNvPicPr>
+            <a:picLocks noChangeAspect="1"/>
+          </p:cNvPicPr>
+          <p:nvPr/>
+        </p:nvPicPr>
+        <p:blipFill>
+          <a:blip r:embed="rId2"/>
+          <a:stretch>
+            <a:fillRect/>
+          </a:stretch>
+        </p:blipFill>
+        <p:spPr>
+          <a:xfrm>
+            <a:off x="459597" y="1728588"/>
+            <a:ext cx="7911132" cy="3621624"/>
+          </a:xfrm>
+          <a:prstGeom prst="rect">
+            <a:avLst/>
+          </a:prstGeom>
+        </p:spPr>
+      </p:pic>
+      <p:sp>
+        <p:nvSpPr>
+          <p:cNvPr id="6" name="Slide Number Placeholder 5">
+            <a:extLst>
+              <a:ext uri="{FF2B5EF4-FFF2-40B4-BE49-F238E27FC236}">
+                <a16:creationId xmlns:a16="http://schemas.microsoft.com/office/drawing/2014/main" id="{B7F3C1FA-17BF-1330-0982-8A53C5D3AE0A}"/>
+              </a:ext>
+            </a:extLst>
+          </p:cNvPr>
+          <p:cNvSpPr>
+            <a:spLocks noGrp="1"/>
+          </p:cNvSpPr>
+          <p:nvPr>
+            <p:ph type="sldNum" sz="quarter" idx="12"/>
+          </p:nvPr>
+        </p:nvSpPr>
+        <p:spPr/>
+        <p:txBody>
+          <a:bodyPr/>
+          <a:lstStyle/>
+          <a:p>
+            <a:fld id="{49ABCAEC-7D34-E549-A96E-FCEDAADBE4B0}" type="slidenum">
+              <a:rPr lang="en-US" smtClean="0"/>
+              <a:t>5</a:t>
+            </a:fld>
+            <a:endParaRPr lang="en-US"/>
+          </a:p>
+        </p:txBody>
+      </p:sp>
+    </p:spTree>
+    <p:extLst>
+      <p:ext uri="{BB962C8B-B14F-4D97-AF65-F5344CB8AC3E}">
+        <p14:creationId xmlns:p14="http://schemas.microsoft.com/office/powerpoint/2010/main" val="1774099850"/>
+      </p:ext>
+    </p:extLst>
+  </p:cSld>
+  <p:clrMapOvr>
+    <a:masterClrMapping/>
+  </p:clrMapOvr>
+</p:sld>
+</file>
+
+<file path=ppt/slides/slide6.xml><?xml version="1.0" encoding="utf-8"?>
+<p:sld xmlns:a="http://schemas.openxmlformats.org/drawingml/2006/main" xmlns:r="http://schemas.openxmlformats.org/officeDocument/2006/relationships" xmlns:p="http://schemas.openxmlformats.org/presentationml/2006/main">
+  <p:cSld>
+    <p:spTree>
+      <p:nvGrpSpPr>
+        <p:cNvPr id="1" name=""/>
+        <p:cNvGrpSpPr/>
+        <p:nvPr/>
+      </p:nvGrpSpPr>
+      <p:grpSpPr>
+        <a:xfrm>
+          <a:off x="0" y="0"/>
+          <a:ext cx="0" cy="0"/>
+          <a:chOff x="0" y="0"/>
+          <a:chExt cx="0" cy="0"/>
+        </a:xfrm>
+      </p:grpSpPr>
+      <p:sp>
+        <p:nvSpPr>
+          <p:cNvPr id="2" name="Title 1">
+            <a:extLst>
+              <a:ext uri="{FF2B5EF4-FFF2-40B4-BE49-F238E27FC236}">
+                <a16:creationId xmlns:a16="http://schemas.microsoft.com/office/drawing/2014/main" id="{859790CD-ABB7-D5C6-ED41-3C863853BA5A}"/>
+              </a:ext>
+            </a:extLst>
+          </p:cNvPr>
+          <p:cNvSpPr>
+            <a:spLocks noGrp="1"/>
+          </p:cNvSpPr>
+          <p:nvPr>
+            <p:ph type="title"/>
+          </p:nvPr>
+        </p:nvSpPr>
+        <p:spPr/>
+        <p:txBody>
+          <a:bodyPr>
+            <a:normAutofit/>
+          </a:bodyPr>
+          <a:lstStyle/>
+          <a:p>
+            <a:r>
+              <a:rPr lang="en-US" dirty="0"/>
+              <a:t>Results</a:t>
+            </a:r>
+          </a:p>
+        </p:txBody>
+      </p:sp>
+      <p:pic>
+        <p:nvPicPr>
+          <p:cNvPr id="4" name="Picture 3">
+            <a:extLst>
+              <a:ext uri="{FF2B5EF4-FFF2-40B4-BE49-F238E27FC236}">
+                <a16:creationId xmlns:a16="http://schemas.microsoft.com/office/drawing/2014/main" id="{E7869A10-0E15-770F-D5CC-117ED1CA0D67}"/>
+              </a:ext>
+            </a:extLst>
+          </p:cNvPr>
+          <p:cNvPicPr>
+            <a:picLocks noChangeAspect="1"/>
+          </p:cNvPicPr>
+          <p:nvPr/>
+        </p:nvPicPr>
+        <p:blipFill>
+          <a:blip r:embed="rId2"/>
+          <a:stretch>
+            <a:fillRect/>
+          </a:stretch>
+        </p:blipFill>
+        <p:spPr>
+          <a:xfrm>
+            <a:off x="565150" y="1435243"/>
+            <a:ext cx="9610928" cy="3987513"/>
+          </a:xfrm>
+          <a:prstGeom prst="rect">
+            <a:avLst/>
+          </a:prstGeom>
+        </p:spPr>
+      </p:pic>
+      <p:cxnSp>
+        <p:nvCxnSpPr>
+          <p:cNvPr id="7" name="Straight Connector 6">
+            <a:extLst>
+              <a:ext uri="{FF2B5EF4-FFF2-40B4-BE49-F238E27FC236}">
+                <a16:creationId xmlns:a16="http://schemas.microsoft.com/office/drawing/2014/main" id="{0CC761A6-0AF1-11DB-804E-D50EC80CF7F6}"/>
+              </a:ext>
+            </a:extLst>
+          </p:cNvPr>
+          <p:cNvCxnSpPr/>
+          <p:nvPr/>
+        </p:nvCxnSpPr>
+        <p:spPr>
+          <a:xfrm>
+            <a:off x="1935804" y="5029200"/>
+            <a:ext cx="1322962" cy="0"/>
+          </a:xfrm>
+          <a:prstGeom prst="line">
+            <a:avLst/>
+          </a:prstGeom>
+        </p:spPr>
+        <p:style>
+          <a:lnRef idx="1">
+            <a:schemeClr val="accent1"/>
+          </a:lnRef>
+          <a:fillRef idx="0">
+            <a:schemeClr val="accent1"/>
+          </a:fillRef>
+          <a:effectRef idx="0">
+            <a:schemeClr val="accent1"/>
+          </a:effectRef>
+          <a:fontRef idx="minor">
+            <a:schemeClr val="tx1"/>
+          </a:fontRef>
+        </p:style>
+      </p:cxnSp>
+      <p:cxnSp>
+        <p:nvCxnSpPr>
+          <p:cNvPr id="8" name="Straight Connector 7">
+            <a:extLst>
+              <a:ext uri="{FF2B5EF4-FFF2-40B4-BE49-F238E27FC236}">
+                <a16:creationId xmlns:a16="http://schemas.microsoft.com/office/drawing/2014/main" id="{FA4E07B7-39FF-298F-5139-96570D7686EB}"/>
+              </a:ext>
+            </a:extLst>
+          </p:cNvPr>
+          <p:cNvCxnSpPr>
+            <a:cxnSpLocks/>
+          </p:cNvCxnSpPr>
+          <p:nvPr/>
+        </p:nvCxnSpPr>
+        <p:spPr>
+          <a:xfrm>
+            <a:off x="1935804" y="5297864"/>
+            <a:ext cx="1184468" cy="707010"/>
+          </a:xfrm>
+          <a:prstGeom prst="line">
+            <a:avLst/>
+          </a:prstGeom>
+        </p:spPr>
+        <p:style>
+          <a:lnRef idx="1">
+            <a:schemeClr val="accent1"/>
+          </a:lnRef>
+          <a:fillRef idx="0">
+            <a:schemeClr val="accent1"/>
+          </a:fillRef>
+          <a:effectRef idx="0">
+            <a:schemeClr val="accent1"/>
+          </a:effectRef>
+          <a:fontRef idx="minor">
+            <a:schemeClr val="tx1"/>
+          </a:fontRef>
+        </p:style>
+      </p:cxnSp>
+      <p:sp>
+        <p:nvSpPr>
+          <p:cNvPr id="11" name="Oval 10">
+            <a:extLst>
+              <a:ext uri="{FF2B5EF4-FFF2-40B4-BE49-F238E27FC236}">
+                <a16:creationId xmlns:a16="http://schemas.microsoft.com/office/drawing/2014/main" id="{AB26A545-0627-269C-0774-4ECFF1204909}"/>
+              </a:ext>
+            </a:extLst>
+          </p:cNvPr>
+          <p:cNvSpPr/>
+          <p:nvPr/>
+        </p:nvSpPr>
+        <p:spPr>
+          <a:xfrm>
+            <a:off x="3050975" y="4782800"/>
+            <a:ext cx="2507530" cy="1727712"/>
+          </a:xfrm>
+          <a:prstGeom prst="ellipse">
+            <a:avLst/>
+          </a:prstGeom>
+          <a:solidFill>
+            <a:schemeClr val="tx1">
+              <a:lumMod val="95000"/>
+              <a:lumOff val="5000"/>
+            </a:schemeClr>
+          </a:solidFill>
+          <a:ln>
+            <a:solidFill>
+              <a:schemeClr val="accent2">
+                <a:lumMod val="75000"/>
+              </a:schemeClr>
+            </a:solidFill>
+          </a:ln>
+        </p:spPr>
+        <p:style>
+          <a:lnRef idx="2">
+            <a:schemeClr val="accent1">
+              <a:shade val="50000"/>
+            </a:schemeClr>
+          </a:lnRef>
+          <a:fillRef idx="1">
+            <a:schemeClr val="accent1"/>
+          </a:fillRef>
+          <a:effectRef idx="0">
+            <a:schemeClr val="accent1"/>
+          </a:effectRef>
+          <a:fontRef idx="minor">
+            <a:schemeClr val="lt1"/>
+          </a:fontRef>
+        </p:style>
+        <p:txBody>
+          <a:bodyPr rtlCol="0" anchor="ctr"/>
+          <a:lstStyle/>
+          <a:p>
+            <a:pPr algn="ctr"/>
+            <a:endParaRPr lang="en-US">
+              <a:solidFill>
+                <a:schemeClr val="tx1">
+                  <a:lumMod val="95000"/>
+                  <a:lumOff val="5000"/>
+                </a:schemeClr>
+              </a:solidFill>
+            </a:endParaRPr>
+          </a:p>
+        </p:txBody>
+      </p:sp>
+      <p:pic>
+        <p:nvPicPr>
+          <p:cNvPr id="13" name="Picture 12">
+            <a:extLst>
+              <a:ext uri="{FF2B5EF4-FFF2-40B4-BE49-F238E27FC236}">
+                <a16:creationId xmlns:a16="http://schemas.microsoft.com/office/drawing/2014/main" id="{24D5D0BF-A899-2487-4847-AA68E77439A2}"/>
+              </a:ext>
+            </a:extLst>
+          </p:cNvPr>
+          <p:cNvPicPr>
+            <a:picLocks noChangeAspect="1"/>
+          </p:cNvPicPr>
+          <p:nvPr/>
+        </p:nvPicPr>
+        <p:blipFill>
+          <a:blip r:embed="rId3"/>
+          <a:stretch>
+            <a:fillRect/>
+          </a:stretch>
+        </p:blipFill>
+        <p:spPr>
+          <a:xfrm>
+            <a:off x="3258766" y="5077739"/>
+            <a:ext cx="2203541" cy="1083589"/>
+          </a:xfrm>
+          <a:prstGeom prst="rect">
+            <a:avLst/>
+          </a:prstGeom>
+        </p:spPr>
+      </p:pic>
+      <p:sp>
+        <p:nvSpPr>
+          <p:cNvPr id="14" name="Slide Number Placeholder 13">
+            <a:extLst>
+              <a:ext uri="{FF2B5EF4-FFF2-40B4-BE49-F238E27FC236}">
+                <a16:creationId xmlns:a16="http://schemas.microsoft.com/office/drawing/2014/main" id="{680803B7-6A5D-3637-5AE5-18E72678D40C}"/>
+              </a:ext>
+            </a:extLst>
+          </p:cNvPr>
+          <p:cNvSpPr>
+            <a:spLocks noGrp="1"/>
+          </p:cNvSpPr>
+          <p:nvPr>
+            <p:ph type="sldNum" sz="quarter" idx="12"/>
+          </p:nvPr>
+        </p:nvSpPr>
+        <p:spPr/>
+        <p:txBody>
+          <a:bodyPr/>
+          <a:lstStyle/>
+          <a:p>
+            <a:fld id="{49ABCAEC-7D34-E549-A96E-FCEDAADBE4B0}" type="slidenum">
+              <a:rPr lang="en-US" smtClean="0"/>
+              <a:t>6</a:t>
+            </a:fld>
+            <a:endParaRPr lang="en-US"/>
+          </a:p>
+        </p:txBody>
+      </p:sp>
+    </p:spTree>
+    <p:extLst>
+      <p:ext uri="{BB962C8B-B14F-4D97-AF65-F5344CB8AC3E}">
+        <p14:creationId xmlns:p14="http://schemas.microsoft.com/office/powerpoint/2010/main" val="1937506028"/>
+      </p:ext>
+    </p:extLst>
+  </p:cSld>
+  <p:clrMapOvr>
+    <a:masterClrMapping/>
+  </p:clrMapOvr>
+</p:sld>
+</file>
+
+<file path=ppt/slides/slide7.xml><?xml version="1.0" encoding="utf-8"?>
+<p:sld xmlns:a="http://schemas.openxmlformats.org/drawingml/2006/main" xmlns:r="http://schemas.openxmlformats.org/officeDocument/2006/relationships" xmlns:p="http://schemas.openxmlformats.org/presentationml/2006/main">
+  <p:cSld>
+    <p:spTree>
+      <p:nvGrpSpPr>
+        <p:cNvPr id="1" name=""/>
+        <p:cNvGrpSpPr/>
+        <p:nvPr/>
+      </p:nvGrpSpPr>
+      <p:grpSpPr>
+        <a:xfrm>
+          <a:off x="0" y="0"/>
+          <a:ext cx="0" cy="0"/>
+          <a:chOff x="0" y="0"/>
+          <a:chExt cx="0" cy="0"/>
+        </a:xfrm>
+      </p:grpSpPr>
+      <p:sp>
+        <p:nvSpPr>
+          <p:cNvPr id="2" name="Title 1">
+            <a:extLst>
+              <a:ext uri="{FF2B5EF4-FFF2-40B4-BE49-F238E27FC236}">
+                <a16:creationId xmlns:a16="http://schemas.microsoft.com/office/drawing/2014/main" id="{859790CD-ABB7-D5C6-ED41-3C863853BA5A}"/>
+              </a:ext>
+            </a:extLst>
+          </p:cNvPr>
+          <p:cNvSpPr>
+            <a:spLocks noGrp="1"/>
+          </p:cNvSpPr>
+          <p:nvPr>
+            <p:ph type="title"/>
+          </p:nvPr>
+        </p:nvSpPr>
+        <p:spPr/>
+        <p:txBody>
+          <a:bodyPr>
+            <a:normAutofit/>
+          </a:bodyPr>
+          <a:lstStyle/>
+          <a:p>
+            <a:r>
+              <a:rPr lang="en-US" dirty="0"/>
+              <a:t>To do:</a:t>
+            </a:r>
           </a:p>
         </p:txBody>
       </p:sp>
@@ -15674,7 +17617,7 @@
           <p:cNvPr id="3" name="Content Placeholder 2">
             <a:extLst>
               <a:ext uri="{FF2B5EF4-FFF2-40B4-BE49-F238E27FC236}">
-                <a16:creationId xmlns:a16="http://schemas.microsoft.com/office/drawing/2014/main" id="{15FB9D63-A201-AB26-76CE-BB065F9272F5}"/>
+                <a16:creationId xmlns:a16="http://schemas.microsoft.com/office/drawing/2014/main" id="{F72DA961-7CD3-A493-A2B8-8231A7FEE67F}"/>
               </a:ext>
             </a:extLst>
           </p:cNvPr>
@@ -15685,11 +17628,68 @@
             <p:ph idx="1"/>
           </p:nvPr>
         </p:nvSpPr>
+        <p:spPr>
+          <a:xfrm>
+            <a:off x="313703" y="1729165"/>
+            <a:ext cx="4729637" cy="2588312"/>
+          </a:xfrm>
+        </p:spPr>
+        <p:txBody>
+          <a:bodyPr>
+            <a:normAutofit/>
+          </a:bodyPr>
+          <a:lstStyle/>
+          <a:p>
+            <a:r>
+              <a:rPr lang="en-US" dirty="0"/>
+              <a:t>Train on full dataset</a:t>
+            </a:r>
+          </a:p>
+          <a:p>
+            <a:r>
+              <a:rPr lang="en-US" dirty="0"/>
+              <a:t>Train on HPC to run more Epochs</a:t>
+            </a:r>
+          </a:p>
+          <a:p>
+            <a:r>
+              <a:rPr lang="en-US" dirty="0"/>
+              <a:t>Change model architecture?</a:t>
+            </a:r>
+          </a:p>
+          <a:p>
+            <a:r>
+              <a:rPr lang="en-US" dirty="0"/>
+              <a:t>Pre-trained model?</a:t>
+            </a:r>
+          </a:p>
+        </p:txBody>
+      </p:sp>
+      <p:sp>
+        <p:nvSpPr>
+          <p:cNvPr id="4" name="Slide Number Placeholder 3">
+            <a:extLst>
+              <a:ext uri="{FF2B5EF4-FFF2-40B4-BE49-F238E27FC236}">
+                <a16:creationId xmlns:a16="http://schemas.microsoft.com/office/drawing/2014/main" id="{CF1CB21B-1752-A9B0-577E-FB43380E215B}"/>
+              </a:ext>
+            </a:extLst>
+          </p:cNvPr>
+          <p:cNvSpPr>
+            <a:spLocks noGrp="1"/>
+          </p:cNvSpPr>
+          <p:nvPr>
+            <p:ph type="sldNum" sz="quarter" idx="12"/>
+          </p:nvPr>
+        </p:nvSpPr>
         <p:spPr/>
         <p:txBody>
           <a:bodyPr/>
           <a:lstStyle/>
           <a:p>
+            <a:fld id="{49ABCAEC-7D34-E549-A96E-FCEDAADBE4B0}" type="slidenum">
+              <a:rPr lang="en-US" smtClean="0"/>
+              <a:t>7</a:t>
+            </a:fld>
             <a:endParaRPr lang="en-US"/>
           </a:p>
         </p:txBody>
@@ -15697,7 +17697,101 @@
     </p:spTree>
     <p:extLst>
       <p:ext uri="{BB962C8B-B14F-4D97-AF65-F5344CB8AC3E}">
-        <p14:creationId xmlns:p14="http://schemas.microsoft.com/office/powerpoint/2010/main" val="3007818029"/>
+        <p14:creationId xmlns:p14="http://schemas.microsoft.com/office/powerpoint/2010/main" val="2130165320"/>
+      </p:ext>
+    </p:extLst>
+  </p:cSld>
+  <p:clrMapOvr>
+    <a:masterClrMapping/>
+  </p:clrMapOvr>
+</p:sld>
+</file>
+
+<file path=ppt/slides/slide8.xml><?xml version="1.0" encoding="utf-8"?>
+<p:sld xmlns:a="http://schemas.openxmlformats.org/drawingml/2006/main" xmlns:r="http://schemas.openxmlformats.org/officeDocument/2006/relationships" xmlns:p="http://schemas.openxmlformats.org/presentationml/2006/main">
+  <p:cSld>
+    <p:spTree>
+      <p:nvGrpSpPr>
+        <p:cNvPr id="1" name=""/>
+        <p:cNvGrpSpPr/>
+        <p:nvPr/>
+      </p:nvGrpSpPr>
+      <p:grpSpPr>
+        <a:xfrm>
+          <a:off x="0" y="0"/>
+          <a:ext cx="0" cy="0"/>
+          <a:chOff x="0" y="0"/>
+          <a:chExt cx="0" cy="0"/>
+        </a:xfrm>
+      </p:grpSpPr>
+      <p:sp>
+        <p:nvSpPr>
+          <p:cNvPr id="2" name="Title 1">
+            <a:extLst>
+              <a:ext uri="{FF2B5EF4-FFF2-40B4-BE49-F238E27FC236}">
+                <a16:creationId xmlns:a16="http://schemas.microsoft.com/office/drawing/2014/main" id="{859790CD-ABB7-D5C6-ED41-3C863853BA5A}"/>
+              </a:ext>
+            </a:extLst>
+          </p:cNvPr>
+          <p:cNvSpPr>
+            <a:spLocks noGrp="1"/>
+          </p:cNvSpPr>
+          <p:nvPr>
+            <p:ph type="title"/>
+          </p:nvPr>
+        </p:nvSpPr>
+        <p:spPr>
+          <a:xfrm>
+            <a:off x="4269885" y="2580836"/>
+            <a:ext cx="3026462" cy="1268984"/>
+          </a:xfrm>
+        </p:spPr>
+        <p:txBody>
+          <a:bodyPr>
+            <a:normAutofit/>
+          </a:bodyPr>
+          <a:lstStyle/>
+          <a:p>
+            <a:r>
+              <a:rPr lang="en-US" dirty="0"/>
+              <a:t>Thank You!</a:t>
+            </a:r>
+          </a:p>
+        </p:txBody>
+      </p:sp>
+      <p:sp>
+        <p:nvSpPr>
+          <p:cNvPr id="6" name="Slide Number Placeholder 5">
+            <a:extLst>
+              <a:ext uri="{FF2B5EF4-FFF2-40B4-BE49-F238E27FC236}">
+                <a16:creationId xmlns:a16="http://schemas.microsoft.com/office/drawing/2014/main" id="{AB5B3FFA-F9EF-F460-C54C-883288D5E7CB}"/>
+              </a:ext>
+            </a:extLst>
+          </p:cNvPr>
+          <p:cNvSpPr>
+            <a:spLocks noGrp="1"/>
+          </p:cNvSpPr>
+          <p:nvPr>
+            <p:ph type="sldNum" sz="quarter" idx="12"/>
+          </p:nvPr>
+        </p:nvSpPr>
+        <p:spPr/>
+        <p:txBody>
+          <a:bodyPr/>
+          <a:lstStyle/>
+          <a:p>
+            <a:fld id="{49ABCAEC-7D34-E549-A96E-FCEDAADBE4B0}" type="slidenum">
+              <a:rPr lang="en-US" smtClean="0"/>
+              <a:t>8</a:t>
+            </a:fld>
+            <a:endParaRPr lang="en-US"/>
+          </a:p>
+        </p:txBody>
+      </p:sp>
+    </p:spTree>
+    <p:extLst>
+      <p:ext uri="{BB962C8B-B14F-4D97-AF65-F5344CB8AC3E}">
+        <p14:creationId xmlns:p14="http://schemas.microsoft.com/office/powerpoint/2010/main" val="3780892971"/>
       </p:ext>
     </p:extLst>
   </p:cSld>
@@ -15906,4 +18000,299 @@
     </a:ext>
   </a:extLst>
 </a:theme>
+</file>
+
+<file path=ppt/theme/theme2.xml><?xml version="1.0" encoding="utf-8"?>
+<a:theme xmlns:a="http://schemas.openxmlformats.org/drawingml/2006/main" name="Office Theme">
+  <a:themeElements>
+    <a:clrScheme name="Office">
+      <a:dk1>
+        <a:sysClr val="windowText" lastClr="000000"/>
+      </a:dk1>
+      <a:lt1>
+        <a:sysClr val="window" lastClr="FFFFFF"/>
+      </a:lt1>
+      <a:dk2>
+        <a:srgbClr val="44546A"/>
+      </a:dk2>
+      <a:lt2>
+        <a:srgbClr val="E7E6E6"/>
+      </a:lt2>
+      <a:accent1>
+        <a:srgbClr val="4472C4"/>
+      </a:accent1>
+      <a:accent2>
+        <a:srgbClr val="ED7D31"/>
+      </a:accent2>
+      <a:accent3>
+        <a:srgbClr val="A5A5A5"/>
+      </a:accent3>
+      <a:accent4>
+        <a:srgbClr val="FFC000"/>
+      </a:accent4>
+      <a:accent5>
+        <a:srgbClr val="5B9BD5"/>
+      </a:accent5>
+      <a:accent6>
+        <a:srgbClr val="70AD47"/>
+      </a:accent6>
+      <a:hlink>
+        <a:srgbClr val="0563C1"/>
+      </a:hlink>
+      <a:folHlink>
+        <a:srgbClr val="954F72"/>
+      </a:folHlink>
+    </a:clrScheme>
+    <a:fontScheme name="Office">
+      <a:majorFont>
+        <a:latin typeface="Calibri Light" panose="020F0302020204030204"/>
+        <a:ea typeface=""/>
+        <a:cs typeface=""/>
+        <a:font script="Jpan" typeface="游ゴシック Light"/>
+        <a:font script="Hang" typeface="맑은 고딕"/>
+        <a:font script="Hans" typeface="等线 Light"/>
+        <a:font script="Hant" typeface="新細明體"/>
+        <a:font script="Arab" typeface="Times New Roman"/>
+        <a:font script="Hebr" typeface="Times New Roman"/>
+        <a:font script="Thai" typeface="Angsana New"/>
+        <a:font script="Ethi" typeface="Nyala"/>
+        <a:font script="Beng" typeface="Vrinda"/>
+        <a:font script="Gujr" typeface="Shruti"/>
+        <a:font script="Khmr" typeface="MoolBoran"/>
+        <a:font script="Knda" typeface="Tunga"/>
+        <a:font script="Guru" typeface="Raavi"/>
+        <a:font script="Cans" typeface="Euphemia"/>
+        <a:font script="Cher" typeface="Plantagenet Cherokee"/>
+        <a:font script="Yiii" typeface="Microsoft Yi Baiti"/>
+        <a:font script="Tibt" typeface="Microsoft Himalaya"/>
+        <a:font script="Thaa" typeface="MV Boli"/>
+        <a:font script="Deva" typeface="Mangal"/>
+        <a:font script="Telu" typeface="Gautami"/>
+        <a:font script="Taml" typeface="Latha"/>
+        <a:font script="Syrc" typeface="Estrangelo Edessa"/>
+        <a:font script="Orya" typeface="Kalinga"/>
+        <a:font script="Mlym" typeface="Kartika"/>
+        <a:font script="Laoo" typeface="DokChampa"/>
+        <a:font script="Sinh" typeface="Iskoola Pota"/>
+        <a:font script="Mong" typeface="Mongolian Baiti"/>
+        <a:font script="Viet" typeface="Times New Roman"/>
+        <a:font script="Uigh" typeface="Microsoft Uighur"/>
+        <a:font script="Geor" typeface="Sylfaen"/>
+        <a:font script="Armn" typeface="Arial"/>
+        <a:font script="Bugi" typeface="Leelawadee UI"/>
+        <a:font script="Bopo" typeface="Microsoft JhengHei"/>
+        <a:font script="Java" typeface="Javanese Text"/>
+        <a:font script="Lisu" typeface="Segoe UI"/>
+        <a:font script="Mymr" typeface="Myanmar Text"/>
+        <a:font script="Nkoo" typeface="Ebrima"/>
+        <a:font script="Olck" typeface="Nirmala UI"/>
+        <a:font script="Osma" typeface="Ebrima"/>
+        <a:font script="Phag" typeface="Phagspa"/>
+        <a:font script="Syrn" typeface="Estrangelo Edessa"/>
+        <a:font script="Syrj" typeface="Estrangelo Edessa"/>
+        <a:font script="Syre" typeface="Estrangelo Edessa"/>
+        <a:font script="Sora" typeface="Nirmala UI"/>
+        <a:font script="Tale" typeface="Microsoft Tai Le"/>
+        <a:font script="Talu" typeface="Microsoft New Tai Lue"/>
+        <a:font script="Tfng" typeface="Ebrima"/>
+      </a:majorFont>
+      <a:minorFont>
+        <a:latin typeface="Calibri" panose="020F0502020204030204"/>
+        <a:ea typeface=""/>
+        <a:cs typeface=""/>
+        <a:font script="Jpan" typeface="游ゴシック"/>
+        <a:font script="Hang" typeface="맑은 고딕"/>
+        <a:font script="Hans" typeface="等线"/>
+        <a:font script="Hant" typeface="新細明體"/>
+        <a:font script="Arab" typeface="Arial"/>
+        <a:font script="Hebr" typeface="Arial"/>
+        <a:font script="Thai" typeface="Cordia New"/>
+        <a:font script="Ethi" typeface="Nyala"/>
+        <a:font script="Beng" typeface="Vrinda"/>
+        <a:font script="Gujr" typeface="Shruti"/>
+        <a:font script="Khmr" typeface="DaunPenh"/>
+        <a:font script="Knda" typeface="Tunga"/>
+        <a:font script="Guru" typeface="Raavi"/>
+        <a:font script="Cans" typeface="Euphemia"/>
+        <a:font script="Cher" typeface="Plantagenet Cherokee"/>
+        <a:font script="Yiii" typeface="Microsoft Yi Baiti"/>
+        <a:font script="Tibt" typeface="Microsoft Himalaya"/>
+        <a:font script="Thaa" typeface="MV Boli"/>
+        <a:font script="Deva" typeface="Mangal"/>
+        <a:font script="Telu" typeface="Gautami"/>
+        <a:font script="Taml" typeface="Latha"/>
+        <a:font script="Syrc" typeface="Estrangelo Edessa"/>
+        <a:font script="Orya" typeface="Kalinga"/>
+        <a:font script="Mlym" typeface="Kartika"/>
+        <a:font script="Laoo" typeface="DokChampa"/>
+        <a:font script="Sinh" typeface="Iskoola Pota"/>
+        <a:font script="Mong" typeface="Mongolian Baiti"/>
+        <a:font script="Viet" typeface="Arial"/>
+        <a:font script="Uigh" typeface="Microsoft Uighur"/>
+        <a:font script="Geor" typeface="Sylfaen"/>
+        <a:font script="Armn" typeface="Arial"/>
+        <a:font script="Bugi" typeface="Leelawadee UI"/>
+        <a:font script="Bopo" typeface="Microsoft JhengHei"/>
+        <a:font script="Java" typeface="Javanese Text"/>
+        <a:font script="Lisu" typeface="Segoe UI"/>
+        <a:font script="Mymr" typeface="Myanmar Text"/>
+        <a:font script="Nkoo" typeface="Ebrima"/>
+        <a:font script="Olck" typeface="Nirmala UI"/>
+        <a:font script="Osma" typeface="Ebrima"/>
+        <a:font script="Phag" typeface="Phagspa"/>
+        <a:font script="Syrn" typeface="Estrangelo Edessa"/>
+        <a:font script="Syrj" typeface="Estrangelo Edessa"/>
+        <a:font script="Syre" typeface="Estrangelo Edessa"/>
+        <a:font script="Sora" typeface="Nirmala UI"/>
+        <a:font script="Tale" typeface="Microsoft Tai Le"/>
+        <a:font script="Talu" typeface="Microsoft New Tai Lue"/>
+        <a:font script="Tfng" typeface="Ebrima"/>
+      </a:minorFont>
+    </a:fontScheme>
+    <a:fmtScheme name="Office">
+      <a:fillStyleLst>
+        <a:solidFill>
+          <a:schemeClr val="phClr"/>
+        </a:solidFill>
+        <a:gradFill rotWithShape="1">
+          <a:gsLst>
+            <a:gs pos="0">
+              <a:schemeClr val="phClr">
+                <a:lumMod val="110000"/>
+                <a:satMod val="105000"/>
+                <a:tint val="67000"/>
+              </a:schemeClr>
+            </a:gs>
+            <a:gs pos="50000">
+              <a:schemeClr val="phClr">
+                <a:lumMod val="105000"/>
+                <a:satMod val="103000"/>
+                <a:tint val="73000"/>
+              </a:schemeClr>
+            </a:gs>
+            <a:gs pos="100000">
+              <a:schemeClr val="phClr">
+                <a:lumMod val="105000"/>
+                <a:satMod val="109000"/>
+                <a:tint val="81000"/>
+              </a:schemeClr>
+            </a:gs>
+          </a:gsLst>
+          <a:lin ang="5400000" scaled="0"/>
+        </a:gradFill>
+        <a:gradFill rotWithShape="1">
+          <a:gsLst>
+            <a:gs pos="0">
+              <a:schemeClr val="phClr">
+                <a:satMod val="103000"/>
+                <a:lumMod val="102000"/>
+                <a:tint val="94000"/>
+              </a:schemeClr>
+            </a:gs>
+            <a:gs pos="50000">
+              <a:schemeClr val="phClr">
+                <a:satMod val="110000"/>
+                <a:lumMod val="100000"/>
+                <a:shade val="100000"/>
+              </a:schemeClr>
+            </a:gs>
+            <a:gs pos="100000">
+              <a:schemeClr val="phClr">
+                <a:lumMod val="99000"/>
+                <a:satMod val="120000"/>
+                <a:shade val="78000"/>
+              </a:schemeClr>
+            </a:gs>
+          </a:gsLst>
+          <a:lin ang="5400000" scaled="0"/>
+        </a:gradFill>
+      </a:fillStyleLst>
+      <a:lnStyleLst>
+        <a:ln w="6350" cap="flat" cmpd="sng" algn="ctr">
+          <a:solidFill>
+            <a:schemeClr val="phClr"/>
+          </a:solidFill>
+          <a:prstDash val="solid"/>
+          <a:miter lim="800000"/>
+        </a:ln>
+        <a:ln w="12700" cap="flat" cmpd="sng" algn="ctr">
+          <a:solidFill>
+            <a:schemeClr val="phClr"/>
+          </a:solidFill>
+          <a:prstDash val="solid"/>
+          <a:miter lim="800000"/>
+        </a:ln>
+        <a:ln w="19050" cap="flat" cmpd="sng" algn="ctr">
+          <a:solidFill>
+            <a:schemeClr val="phClr"/>
+          </a:solidFill>
+          <a:prstDash val="solid"/>
+          <a:miter lim="800000"/>
+        </a:ln>
+      </a:lnStyleLst>
+      <a:effectStyleLst>
+        <a:effectStyle>
+          <a:effectLst/>
+        </a:effectStyle>
+        <a:effectStyle>
+          <a:effectLst/>
+        </a:effectStyle>
+        <a:effectStyle>
+          <a:effectLst>
+            <a:outerShdw blurRad="57150" dist="19050" dir="5400000" algn="ctr" rotWithShape="0">
+              <a:srgbClr val="000000">
+                <a:alpha val="63000"/>
+              </a:srgbClr>
+            </a:outerShdw>
+          </a:effectLst>
+        </a:effectStyle>
+      </a:effectStyleLst>
+      <a:bgFillStyleLst>
+        <a:solidFill>
+          <a:schemeClr val="phClr"/>
+        </a:solidFill>
+        <a:solidFill>
+          <a:schemeClr val="phClr">
+            <a:tint val="95000"/>
+            <a:satMod val="170000"/>
+          </a:schemeClr>
+        </a:solidFill>
+        <a:gradFill rotWithShape="1">
+          <a:gsLst>
+            <a:gs pos="0">
+              <a:schemeClr val="phClr">
+                <a:tint val="93000"/>
+                <a:satMod val="150000"/>
+                <a:shade val="98000"/>
+                <a:lumMod val="102000"/>
+              </a:schemeClr>
+            </a:gs>
+            <a:gs pos="50000">
+              <a:schemeClr val="phClr">
+                <a:tint val="98000"/>
+                <a:satMod val="130000"/>
+                <a:shade val="90000"/>
+                <a:lumMod val="103000"/>
+              </a:schemeClr>
+            </a:gs>
+            <a:gs pos="100000">
+              <a:schemeClr val="phClr">
+                <a:shade val="63000"/>
+                <a:satMod val="120000"/>
+              </a:schemeClr>
+            </a:gs>
+          </a:gsLst>
+          <a:lin ang="5400000" scaled="0"/>
+        </a:gradFill>
+      </a:bgFillStyleLst>
+    </a:fmtScheme>
+  </a:themeElements>
+  <a:objectDefaults/>
+  <a:extraClrSchemeLst/>
+  <a:extLst>
+    <a:ext uri="{05A4C25C-085E-4340-85A3-A5531E510DB2}">
+      <thm15:themeFamily xmlns:thm15="http://schemas.microsoft.com/office/thememl/2012/main" name="Office Theme" id="{62F939B6-93AF-4DB8-9C6B-D6C7DFDC589F}" vid="{4A3C46E8-61CC-4603-A589-7422A47A8E4A}"/>
+    </a:ext>
+  </a:extLst>
+</a:theme>
 </file>
</xml_diff>